<commit_message>
prepping for con and found a mistake in stitching of S20
</commit_message>
<xml_diff>
--- a/Amadis_tei_conf_images.pptx
+++ b/Amadis_tei_conf_images.pptx
@@ -12,8 +12,8 @@
     <p:sldId id="258" r:id="rId3"/>
     <p:sldId id="267" r:id="rId4"/>
     <p:sldId id="266" r:id="rId5"/>
-    <p:sldId id="259" r:id="rId6"/>
-    <p:sldId id="265" r:id="rId7"/>
+    <p:sldId id="265" r:id="rId6"/>
+    <p:sldId id="259" r:id="rId7"/>
     <p:sldId id="263" r:id="rId8"/>
     <p:sldId id="264" r:id="rId9"/>
     <p:sldId id="261" r:id="rId10"/>
@@ -200,7 +200,7 @@
           <a:p>
             <a:fld id="{1567ADDC-A5F7-6948-9B24-2C078ECBC864}" type="datetimeFigureOut">
               <a:rPr lang="en-US" smtClean="0"/>
-              <a:t>10/28/15</a:t>
+              <a:t>10/29/15</a:t>
             </a:fld>
             <a:endParaRPr lang="en-US"/>
           </a:p>
@@ -544,11 +544,7 @@
             </a:r>
             <a:r>
               <a:rPr lang="en-US" baseline="0" dirty="0" err="1" smtClean="0"/>
-              <a:t>caballer</a:t>
-            </a:r>
-            <a:r>
-              <a:rPr lang="en-US" baseline="0" dirty="0" err="1" smtClean="0"/>
-              <a:t>ías</a:t>
+              <a:t>caballerías</a:t>
             </a:r>
             <a:r>
               <a:rPr lang="en-US" baseline="0" dirty="0" smtClean="0"/>
@@ -955,10 +951,6 @@
           <a:bodyPr/>
           <a:lstStyle/>
           <a:p>
-            <a:r>
-              <a:rPr lang="en-US" dirty="0" smtClean="0"/>
-              <a:t>Image 5: Southey’s internal divisions</a:t>
-            </a:r>
             <a:endParaRPr lang="en-US" dirty="0"/>
           </a:p>
         </p:txBody>
@@ -1043,6 +1035,30 @@
           <a:bodyPr/>
           <a:lstStyle/>
           <a:p>
+            <a:r>
+              <a:rPr lang="en-US" dirty="0" smtClean="0"/>
+              <a:t>Image </a:t>
+            </a:r>
+            <a:r>
+              <a:rPr lang="en-US" dirty="0" smtClean="0"/>
+              <a:t>6: </a:t>
+            </a:r>
+            <a:r>
+              <a:rPr lang="en-US" dirty="0" smtClean="0"/>
+              <a:t>Southey’s internal </a:t>
+            </a:r>
+            <a:r>
+              <a:rPr lang="en-US" dirty="0" smtClean="0"/>
+              <a:t>divisions. From Chapter 1, in</a:t>
+            </a:r>
+            <a:r>
+              <a:rPr lang="en-US" baseline="0" dirty="0" smtClean="0"/>
+              <a:t> a place with no paragraph division in the </a:t>
+            </a:r>
+            <a:r>
+              <a:rPr lang="en-US" baseline="0" dirty="0" err="1" smtClean="0"/>
+              <a:t>MOntalvo</a:t>
+            </a:r>
             <a:endParaRPr lang="en-US" dirty="0"/>
           </a:p>
         </p:txBody>
@@ -1523,7 +1539,7 @@
           <a:p>
             <a:fld id="{6BFECD78-3C8E-49F2-8FAB-59489D168ABB}" type="datetimeFigureOut">
               <a:rPr lang="en-US" smtClean="0"/>
-              <a:t>10/28/15</a:t>
+              <a:t>10/29/15</a:t>
             </a:fld>
             <a:endParaRPr lang="en-US"/>
           </a:p>
@@ -1724,7 +1740,7 @@
           <a:p>
             <a:fld id="{6BFECD78-3C8E-49F2-8FAB-59489D168ABB}" type="datetimeFigureOut">
               <a:rPr lang="en-US" smtClean="0"/>
-              <a:t>10/28/15</a:t>
+              <a:t>10/29/15</a:t>
             </a:fld>
             <a:endParaRPr lang="en-US"/>
           </a:p>
@@ -1899,7 +1915,7 @@
           <a:p>
             <a:fld id="{6BFECD78-3C8E-49F2-8FAB-59489D168ABB}" type="datetimeFigureOut">
               <a:rPr lang="en-US" smtClean="0"/>
-              <a:t>10/28/15</a:t>
+              <a:t>10/29/15</a:t>
             </a:fld>
             <a:endParaRPr lang="en-US"/>
           </a:p>
@@ -2064,7 +2080,7 @@
           <a:p>
             <a:fld id="{6BFECD78-3C8E-49F2-8FAB-59489D168ABB}" type="datetimeFigureOut">
               <a:rPr lang="en-US" smtClean="0"/>
-              <a:t>10/28/15</a:t>
+              <a:t>10/29/15</a:t>
             </a:fld>
             <a:endParaRPr lang="en-US"/>
           </a:p>
@@ -2312,7 +2328,7 @@
           <a:p>
             <a:fld id="{6BFECD78-3C8E-49F2-8FAB-59489D168ABB}" type="datetimeFigureOut">
               <a:rPr lang="en-US" smtClean="0"/>
-              <a:t>10/28/15</a:t>
+              <a:t>10/29/15</a:t>
             </a:fld>
             <a:endParaRPr lang="en-US"/>
           </a:p>
@@ -2630,7 +2646,7 @@
           <a:p>
             <a:fld id="{6BFECD78-3C8E-49F2-8FAB-59489D168ABB}" type="datetimeFigureOut">
               <a:rPr lang="en-US" smtClean="0"/>
-              <a:t>10/28/15</a:t>
+              <a:t>10/29/15</a:t>
             </a:fld>
             <a:endParaRPr lang="en-US"/>
           </a:p>
@@ -3096,7 +3112,7 @@
           <a:p>
             <a:fld id="{6BFECD78-3C8E-49F2-8FAB-59489D168ABB}" type="datetimeFigureOut">
               <a:rPr lang="en-US" smtClean="0"/>
-              <a:t>10/28/15</a:t>
+              <a:t>10/29/15</a:t>
             </a:fld>
             <a:endParaRPr lang="en-US"/>
           </a:p>
@@ -3244,7 +3260,7 @@
           <a:p>
             <a:fld id="{6BFECD78-3C8E-49F2-8FAB-59489D168ABB}" type="datetimeFigureOut">
               <a:rPr lang="en-US" smtClean="0"/>
-              <a:t>10/28/15</a:t>
+              <a:t>10/29/15</a:t>
             </a:fld>
             <a:endParaRPr lang="en-US"/>
           </a:p>
@@ -3334,7 +3350,7 @@
           <a:p>
             <a:fld id="{6BFECD78-3C8E-49F2-8FAB-59489D168ABB}" type="datetimeFigureOut">
               <a:rPr lang="en-US" smtClean="0"/>
-              <a:t>10/28/15</a:t>
+              <a:t>10/29/15</a:t>
             </a:fld>
             <a:endParaRPr lang="en-US"/>
           </a:p>
@@ -3608,7 +3624,7 @@
           <a:p>
             <a:fld id="{6BFECD78-3C8E-49F2-8FAB-59489D168ABB}" type="datetimeFigureOut">
               <a:rPr lang="en-US" smtClean="0"/>
-              <a:t>10/28/15</a:t>
+              <a:t>10/29/15</a:t>
             </a:fld>
             <a:endParaRPr lang="en-US"/>
           </a:p>
@@ -3914,7 +3930,7 @@
           <a:p>
             <a:fld id="{6BFECD78-3C8E-49F2-8FAB-59489D168ABB}" type="datetimeFigureOut">
               <a:rPr lang="en-US" smtClean="0"/>
-              <a:t>10/28/15</a:t>
+              <a:t>10/29/15</a:t>
             </a:fld>
             <a:endParaRPr lang="en-US"/>
           </a:p>
@@ -4212,7 +4228,7 @@
           <a:p>
             <a:fld id="{6BFECD78-3C8E-49F2-8FAB-59489D168ABB}" type="datetimeFigureOut">
               <a:rPr lang="en-US" smtClean="0"/>
-              <a:t>10/28/15</a:t>
+              <a:t>10/29/15</a:t>
             </a:fld>
             <a:endParaRPr lang="en-US"/>
           </a:p>
@@ -4832,11 +4848,7 @@
             </a:r>
             <a:r>
               <a:rPr lang="en-US" sz="3200" dirty="0" err="1" smtClean="0"/>
-              <a:t>calder</a:t>
-            </a:r>
-            <a:r>
-              <a:rPr lang="en-US" sz="3200" dirty="0" err="1" smtClean="0"/>
-              <a:t>ón</a:t>
+              <a:t>calderón</a:t>
             </a:r>
             <a:r>
               <a:rPr lang="en-US" sz="3200" dirty="0" smtClean="0"/>
@@ -5038,7 +5050,7 @@
       </p:grpSpPr>
       <p:pic>
         <p:nvPicPr>
-          <p:cNvPr id="11" name="Content Placeholder 10" descr="Screen Shot 2015-10-28 at 6.19.40 PM.png"/>
+          <p:cNvPr id="3" name="Content Placeholder 2" descr="Screen Shot 2015-10-28 at 5.05.00 PM.png"/>
           <p:cNvPicPr>
             <a:picLocks noGrp="1" noChangeAspect="1"/>
           </p:cNvPicPr>
@@ -5046,7 +5058,7 @@
             <p:ph idx="1"/>
           </p:nvPr>
         </p:nvPicPr>
-        <p:blipFill>
+        <p:blipFill rotWithShape="1">
           <a:blip r:embed="rId3">
             <a:extLst>
               <a:ext uri="{28A0092B-C50C-407E-A947-70E740481C1C}">
@@ -5054,22 +5066,20 @@
               </a:ext>
             </a:extLst>
           </a:blip>
-          <a:srcRect l="-1144" r="-1144"/>
-          <a:stretch>
-            <a:fillRect/>
-          </a:stretch>
+          <a:srcRect l="-22810" t="14657" r="-19642" b="10783"/>
+          <a:stretch/>
         </p:blipFill>
         <p:spPr>
           <a:xfrm>
-            <a:off x="1851368" y="1788312"/>
-            <a:ext cx="5274774" cy="3125792"/>
+            <a:off x="-1245717" y="657878"/>
+            <a:ext cx="11486350" cy="5263028"/>
           </a:xfrm>
         </p:spPr>
       </p:pic>
     </p:spTree>
     <p:extLst>
       <p:ext uri="{BB962C8B-B14F-4D97-AF65-F5344CB8AC3E}">
-        <p14:creationId xmlns:p14="http://schemas.microsoft.com/office/powerpoint/2010/main" val="2515121915"/>
+        <p14:creationId xmlns:p14="http://schemas.microsoft.com/office/powerpoint/2010/main" val="3944512546"/>
       </p:ext>
     </p:extLst>
   </p:cSld>
@@ -5103,29 +5113,40 @@
           <a:chExt cx="0" cy="0"/>
         </a:xfrm>
       </p:grpSpPr>
-      <p:sp>
-        <p:nvSpPr>
-          <p:cNvPr id="2" name="Content Placeholder 1"/>
-          <p:cNvSpPr>
-            <a:spLocks noGrp="1"/>
-          </p:cNvSpPr>
+      <p:pic>
+        <p:nvPicPr>
+          <p:cNvPr id="11" name="Content Placeholder 10" descr="Screen Shot 2015-10-28 at 6.19.40 PM.png"/>
+          <p:cNvPicPr>
+            <a:picLocks noGrp="1" noChangeAspect="1"/>
+          </p:cNvPicPr>
           <p:nvPr>
             <p:ph idx="1"/>
           </p:nvPr>
-        </p:nvSpPr>
-        <p:spPr/>
-        <p:txBody>
-          <a:bodyPr/>
-          <a:lstStyle/>
-          <a:p>
-            <a:endParaRPr lang="en-US"/>
-          </a:p>
-        </p:txBody>
-      </p:sp>
+        </p:nvPicPr>
+        <p:blipFill>
+          <a:blip r:embed="rId3">
+            <a:extLst>
+              <a:ext uri="{28A0092B-C50C-407E-A947-70E740481C1C}">
+                <a14:useLocalDpi xmlns:a14="http://schemas.microsoft.com/office/drawing/2010/main" val="0"/>
+              </a:ext>
+            </a:extLst>
+          </a:blip>
+          <a:srcRect l="-1144" r="-1144"/>
+          <a:stretch>
+            <a:fillRect/>
+          </a:stretch>
+        </p:blipFill>
+        <p:spPr>
+          <a:xfrm>
+            <a:off x="1851368" y="1788312"/>
+            <a:ext cx="5274774" cy="3125792"/>
+          </a:xfrm>
+        </p:spPr>
+      </p:pic>
     </p:spTree>
     <p:extLst>
       <p:ext uri="{BB962C8B-B14F-4D97-AF65-F5344CB8AC3E}">
-        <p14:creationId xmlns:p14="http://schemas.microsoft.com/office/powerpoint/2010/main" val="3944512546"/>
+        <p14:creationId xmlns:p14="http://schemas.microsoft.com/office/powerpoint/2010/main" val="2515121915"/>
       </p:ext>
     </p:extLst>
   </p:cSld>

</xml_diff>

<commit_message>
working on conference ppt
</commit_message>
<xml_diff>
--- a/Amadis_tei_conf_images.pptx
+++ b/Amadis_tei_conf_images.pptx
@@ -5,33 +5,23 @@
     <p:sldMasterId id="2147483846" r:id="rId1"/>
   </p:sldMasterIdLst>
   <p:notesMasterIdLst>
-    <p:notesMasterId r:id="rId26"/>
+    <p:notesMasterId r:id="rId16"/>
   </p:notesMasterIdLst>
   <p:sldIdLst>
-    <p:sldId id="282" r:id="rId2"/>
-    <p:sldId id="257" r:id="rId3"/>
-    <p:sldId id="258" r:id="rId4"/>
-    <p:sldId id="267" r:id="rId5"/>
-    <p:sldId id="266" r:id="rId6"/>
-    <p:sldId id="265" r:id="rId7"/>
-    <p:sldId id="259" r:id="rId8"/>
-    <p:sldId id="263" r:id="rId9"/>
-    <p:sldId id="264" r:id="rId10"/>
-    <p:sldId id="261" r:id="rId11"/>
-    <p:sldId id="268" r:id="rId12"/>
-    <p:sldId id="269" r:id="rId13"/>
-    <p:sldId id="270" r:id="rId14"/>
-    <p:sldId id="271" r:id="rId15"/>
-    <p:sldId id="272" r:id="rId16"/>
-    <p:sldId id="273" r:id="rId17"/>
-    <p:sldId id="274" r:id="rId18"/>
-    <p:sldId id="275" r:id="rId19"/>
-    <p:sldId id="276" r:id="rId20"/>
-    <p:sldId id="277" r:id="rId21"/>
-    <p:sldId id="278" r:id="rId22"/>
-    <p:sldId id="279" r:id="rId23"/>
-    <p:sldId id="280" r:id="rId24"/>
-    <p:sldId id="281" r:id="rId25"/>
+    <p:sldId id="283" r:id="rId2"/>
+    <p:sldId id="282" r:id="rId3"/>
+    <p:sldId id="257" r:id="rId4"/>
+    <p:sldId id="258" r:id="rId5"/>
+    <p:sldId id="267" r:id="rId6"/>
+    <p:sldId id="266" r:id="rId7"/>
+    <p:sldId id="265" r:id="rId8"/>
+    <p:sldId id="259" r:id="rId9"/>
+    <p:sldId id="263" r:id="rId10"/>
+    <p:sldId id="264" r:id="rId11"/>
+    <p:sldId id="284" r:id="rId12"/>
+    <p:sldId id="261" r:id="rId13"/>
+    <p:sldId id="268" r:id="rId14"/>
+    <p:sldId id="269" r:id="rId15"/>
   </p:sldIdLst>
   <p:sldSz cx="9144000" cy="6858000" type="screen4x3"/>
   <p:notesSz cx="6858000" cy="9144000"/>
@@ -215,7 +205,7 @@
           <a:p>
             <a:fld id="{1567ADDC-A5F7-6948-9B24-2C078ECBC864}" type="datetimeFigureOut">
               <a:rPr lang="en-US" smtClean="0"/>
-              <a:t>10/29/15</a:t>
+              <a:t>10/30/15</a:t>
             </a:fld>
             <a:endParaRPr lang="en-US"/>
           </a:p>
@@ -527,6 +517,14 @@
           <a:bodyPr/>
           <a:lstStyle/>
           <a:p>
+            <a:r>
+              <a:rPr lang="en-US" dirty="0" smtClean="0"/>
+              <a:t>About page from</a:t>
+            </a:r>
+            <a:r>
+              <a:rPr lang="en-US" baseline="0" dirty="0" smtClean="0"/>
+              <a:t> our website, which we are currently building</a:t>
+            </a:r>
             <a:endParaRPr lang="en-US" dirty="0"/>
           </a:p>
         </p:txBody>
@@ -548,7 +546,7 @@
           <a:p>
             <a:fld id="{F643181A-FD5F-E940-B6DC-320B23DAA7AA}" type="slidenum">
               <a:rPr lang="en-US" smtClean="0"/>
-              <a:t>1</a:t>
+              <a:t>2</a:t>
             </a:fld>
             <a:endParaRPr lang="en-US"/>
           </a:p>
@@ -613,19 +611,27 @@
           <a:p>
             <a:r>
               <a:rPr lang="en-US" dirty="0" smtClean="0"/>
-              <a:t>Image 9: From </a:t>
-            </a:r>
-            <a:r>
-              <a:rPr lang="en-US" dirty="0" err="1" smtClean="0"/>
-              <a:t>Montalvo</a:t>
-            </a:r>
-            <a:r>
-              <a:rPr lang="en-US" dirty="0" smtClean="0"/>
-              <a:t> 20/ Southey 21. Show where</a:t>
+              <a:t>Alignment</a:t>
             </a:r>
             <a:r>
               <a:rPr lang="en-US" baseline="0" dirty="0" smtClean="0"/>
-              <a:t> this corresponds—this is typical of Southey’s omission criteria. Repetition, participation of minor characters.</a:t>
+              <a:t> coding in table by Helena </a:t>
+            </a:r>
+            <a:r>
+              <a:rPr lang="en-US" baseline="0" dirty="0" err="1" smtClean="0"/>
+              <a:t>Berm</a:t>
+            </a:r>
+            <a:r>
+              <a:rPr lang="en-US" baseline="0" dirty="0" err="1" smtClean="0"/>
+              <a:t>údez</a:t>
+            </a:r>
+            <a:r>
+              <a:rPr lang="en-US" baseline="0" dirty="0" smtClean="0"/>
+              <a:t> </a:t>
+            </a:r>
+            <a:r>
+              <a:rPr lang="en-US" baseline="0" dirty="0" err="1" smtClean="0"/>
+              <a:t>Sabel</a:t>
             </a:r>
             <a:endParaRPr lang="en-US" dirty="0"/>
           </a:p>
@@ -648,7 +654,7 @@
           <a:p>
             <a:fld id="{F643181A-FD5F-E940-B6DC-320B23DAA7AA}" type="slidenum">
               <a:rPr lang="en-US" smtClean="0"/>
-              <a:t>10</a:t>
+              <a:t>11</a:t>
             </a:fld>
             <a:endParaRPr lang="en-US"/>
           </a:p>
@@ -711,6 +717,22 @@
           <a:bodyPr/>
           <a:lstStyle/>
           <a:p>
+            <a:r>
+              <a:rPr lang="en-US" dirty="0" smtClean="0"/>
+              <a:t>Image 9: From </a:t>
+            </a:r>
+            <a:r>
+              <a:rPr lang="en-US" dirty="0" err="1" smtClean="0"/>
+              <a:t>Montalvo</a:t>
+            </a:r>
+            <a:r>
+              <a:rPr lang="en-US" dirty="0" smtClean="0"/>
+              <a:t> 20/ Southey 21. Show where</a:t>
+            </a:r>
+            <a:r>
+              <a:rPr lang="en-US" baseline="0" dirty="0" smtClean="0"/>
+              <a:t> this corresponds—this is typical of Southey’s omission criteria. Repetition, participation of minor characters.</a:t>
+            </a:r>
             <a:endParaRPr lang="en-US" dirty="0"/>
           </a:p>
         </p:txBody>
@@ -732,7 +754,7 @@
           <a:p>
             <a:fld id="{F643181A-FD5F-E940-B6DC-320B23DAA7AA}" type="slidenum">
               <a:rPr lang="en-US" smtClean="0"/>
-              <a:t>11</a:t>
+              <a:t>12</a:t>
             </a:fld>
             <a:endParaRPr lang="en-US"/>
           </a:p>
@@ -816,7 +838,7 @@
           <a:p>
             <a:fld id="{F643181A-FD5F-E940-B6DC-320B23DAA7AA}" type="slidenum">
               <a:rPr lang="en-US" smtClean="0"/>
-              <a:t>12</a:t>
+              <a:t>13</a:t>
             </a:fld>
             <a:endParaRPr lang="en-US"/>
           </a:p>
@@ -879,6 +901,30 @@
           <a:bodyPr/>
           <a:lstStyle/>
           <a:p>
+            <a:r>
+              <a:rPr lang="en-US" dirty="0" smtClean="0"/>
+              <a:t>Anthon</a:t>
+            </a:r>
+            <a:r>
+              <a:rPr lang="en-US" baseline="0" dirty="0" smtClean="0"/>
+              <a:t>y </a:t>
+            </a:r>
+            <a:r>
+              <a:rPr lang="en-US" baseline="0" dirty="0" err="1" smtClean="0"/>
+              <a:t>Munday’s</a:t>
+            </a:r>
+            <a:r>
+              <a:rPr lang="en-US" baseline="0" dirty="0" smtClean="0"/>
+              <a:t> </a:t>
+            </a:r>
+            <a:r>
+              <a:rPr lang="en-US" baseline="0" dirty="0" err="1" smtClean="0"/>
+              <a:t>Amadis</a:t>
+            </a:r>
+            <a:r>
+              <a:rPr lang="en-US" baseline="0" dirty="0" smtClean="0"/>
+              <a:t> is 1590</a:t>
+            </a:r>
             <a:endParaRPr lang="en-US" dirty="0"/>
           </a:p>
         </p:txBody>
@@ -900,511 +946,7 @@
           <a:p>
             <a:fld id="{F643181A-FD5F-E940-B6DC-320B23DAA7AA}" type="slidenum">
               <a:rPr lang="en-US" smtClean="0"/>
-              <a:t>13</a:t>
-            </a:fld>
-            <a:endParaRPr lang="en-US"/>
-          </a:p>
-        </p:txBody>
-      </p:sp>
-    </p:spTree>
-    <p:extLst>
-      <p:ext uri="{BB962C8B-B14F-4D97-AF65-F5344CB8AC3E}">
-        <p14:creationId xmlns:p14="http://schemas.microsoft.com/office/powerpoint/2010/main" val="147813387"/>
-      </p:ext>
-    </p:extLst>
-  </p:cSld>
-  <p:clrMapOvr>
-    <a:masterClrMapping/>
-  </p:clrMapOvr>
-</p:notes>
-</file>
-
-<file path=ppt/notesSlides/notesSlide14.xml><?xml version="1.0" encoding="utf-8"?>
-<p:notes xmlns:a="http://schemas.openxmlformats.org/drawingml/2006/main" xmlns:r="http://schemas.openxmlformats.org/officeDocument/2006/relationships" xmlns:p="http://schemas.openxmlformats.org/presentationml/2006/main">
-  <p:cSld>
-    <p:spTree>
-      <p:nvGrpSpPr>
-        <p:cNvPr id="1" name=""/>
-        <p:cNvGrpSpPr/>
-        <p:nvPr/>
-      </p:nvGrpSpPr>
-      <p:grpSpPr>
-        <a:xfrm>
-          <a:off x="0" y="0"/>
-          <a:ext cx="0" cy="0"/>
-          <a:chOff x="0" y="0"/>
-          <a:chExt cx="0" cy="0"/>
-        </a:xfrm>
-      </p:grpSpPr>
-      <p:sp>
-        <p:nvSpPr>
-          <p:cNvPr id="2" name="Slide Image Placeholder 1"/>
-          <p:cNvSpPr>
-            <a:spLocks noGrp="1" noRot="1" noChangeAspect="1"/>
-          </p:cNvSpPr>
-          <p:nvPr>
-            <p:ph type="sldImg"/>
-          </p:nvPr>
-        </p:nvSpPr>
-        <p:spPr/>
-      </p:sp>
-      <p:sp>
-        <p:nvSpPr>
-          <p:cNvPr id="3" name="Notes Placeholder 2"/>
-          <p:cNvSpPr>
-            <a:spLocks noGrp="1"/>
-          </p:cNvSpPr>
-          <p:nvPr>
-            <p:ph type="body" idx="1"/>
-          </p:nvPr>
-        </p:nvSpPr>
-        <p:spPr/>
-        <p:txBody>
-          <a:bodyPr/>
-          <a:lstStyle/>
-          <a:p>
-            <a:endParaRPr lang="en-US" dirty="0"/>
-          </a:p>
-        </p:txBody>
-      </p:sp>
-      <p:sp>
-        <p:nvSpPr>
-          <p:cNvPr id="4" name="Slide Number Placeholder 3"/>
-          <p:cNvSpPr>
-            <a:spLocks noGrp="1"/>
-          </p:cNvSpPr>
-          <p:nvPr>
-            <p:ph type="sldNum" sz="quarter" idx="10"/>
-          </p:nvPr>
-        </p:nvSpPr>
-        <p:spPr/>
-        <p:txBody>
-          <a:bodyPr/>
-          <a:lstStyle/>
-          <a:p>
-            <a:fld id="{F643181A-FD5F-E940-B6DC-320B23DAA7AA}" type="slidenum">
-              <a:rPr lang="en-US" smtClean="0"/>
               <a:t>14</a:t>
-            </a:fld>
-            <a:endParaRPr lang="en-US"/>
-          </a:p>
-        </p:txBody>
-      </p:sp>
-    </p:spTree>
-    <p:extLst>
-      <p:ext uri="{BB962C8B-B14F-4D97-AF65-F5344CB8AC3E}">
-        <p14:creationId xmlns:p14="http://schemas.microsoft.com/office/powerpoint/2010/main" val="147813387"/>
-      </p:ext>
-    </p:extLst>
-  </p:cSld>
-  <p:clrMapOvr>
-    <a:masterClrMapping/>
-  </p:clrMapOvr>
-</p:notes>
-</file>
-
-<file path=ppt/notesSlides/notesSlide15.xml><?xml version="1.0" encoding="utf-8"?>
-<p:notes xmlns:a="http://schemas.openxmlformats.org/drawingml/2006/main" xmlns:r="http://schemas.openxmlformats.org/officeDocument/2006/relationships" xmlns:p="http://schemas.openxmlformats.org/presentationml/2006/main">
-  <p:cSld>
-    <p:spTree>
-      <p:nvGrpSpPr>
-        <p:cNvPr id="1" name=""/>
-        <p:cNvGrpSpPr/>
-        <p:nvPr/>
-      </p:nvGrpSpPr>
-      <p:grpSpPr>
-        <a:xfrm>
-          <a:off x="0" y="0"/>
-          <a:ext cx="0" cy="0"/>
-          <a:chOff x="0" y="0"/>
-          <a:chExt cx="0" cy="0"/>
-        </a:xfrm>
-      </p:grpSpPr>
-      <p:sp>
-        <p:nvSpPr>
-          <p:cNvPr id="2" name="Slide Image Placeholder 1"/>
-          <p:cNvSpPr>
-            <a:spLocks noGrp="1" noRot="1" noChangeAspect="1"/>
-          </p:cNvSpPr>
-          <p:nvPr>
-            <p:ph type="sldImg"/>
-          </p:nvPr>
-        </p:nvSpPr>
-        <p:spPr/>
-      </p:sp>
-      <p:sp>
-        <p:nvSpPr>
-          <p:cNvPr id="3" name="Notes Placeholder 2"/>
-          <p:cNvSpPr>
-            <a:spLocks noGrp="1"/>
-          </p:cNvSpPr>
-          <p:nvPr>
-            <p:ph type="body" idx="1"/>
-          </p:nvPr>
-        </p:nvSpPr>
-        <p:spPr/>
-        <p:txBody>
-          <a:bodyPr/>
-          <a:lstStyle/>
-          <a:p>
-            <a:endParaRPr lang="en-US" dirty="0"/>
-          </a:p>
-        </p:txBody>
-      </p:sp>
-      <p:sp>
-        <p:nvSpPr>
-          <p:cNvPr id="4" name="Slide Number Placeholder 3"/>
-          <p:cNvSpPr>
-            <a:spLocks noGrp="1"/>
-          </p:cNvSpPr>
-          <p:nvPr>
-            <p:ph type="sldNum" sz="quarter" idx="10"/>
-          </p:nvPr>
-        </p:nvSpPr>
-        <p:spPr/>
-        <p:txBody>
-          <a:bodyPr/>
-          <a:lstStyle/>
-          <a:p>
-            <a:fld id="{F643181A-FD5F-E940-B6DC-320B23DAA7AA}" type="slidenum">
-              <a:rPr lang="en-US" smtClean="0"/>
-              <a:t>15</a:t>
-            </a:fld>
-            <a:endParaRPr lang="en-US"/>
-          </a:p>
-        </p:txBody>
-      </p:sp>
-    </p:spTree>
-    <p:extLst>
-      <p:ext uri="{BB962C8B-B14F-4D97-AF65-F5344CB8AC3E}">
-        <p14:creationId xmlns:p14="http://schemas.microsoft.com/office/powerpoint/2010/main" val="147813387"/>
-      </p:ext>
-    </p:extLst>
-  </p:cSld>
-  <p:clrMapOvr>
-    <a:masterClrMapping/>
-  </p:clrMapOvr>
-</p:notes>
-</file>
-
-<file path=ppt/notesSlides/notesSlide16.xml><?xml version="1.0" encoding="utf-8"?>
-<p:notes xmlns:a="http://schemas.openxmlformats.org/drawingml/2006/main" xmlns:r="http://schemas.openxmlformats.org/officeDocument/2006/relationships" xmlns:p="http://schemas.openxmlformats.org/presentationml/2006/main">
-  <p:cSld>
-    <p:spTree>
-      <p:nvGrpSpPr>
-        <p:cNvPr id="1" name=""/>
-        <p:cNvGrpSpPr/>
-        <p:nvPr/>
-      </p:nvGrpSpPr>
-      <p:grpSpPr>
-        <a:xfrm>
-          <a:off x="0" y="0"/>
-          <a:ext cx="0" cy="0"/>
-          <a:chOff x="0" y="0"/>
-          <a:chExt cx="0" cy="0"/>
-        </a:xfrm>
-      </p:grpSpPr>
-      <p:sp>
-        <p:nvSpPr>
-          <p:cNvPr id="2" name="Slide Image Placeholder 1"/>
-          <p:cNvSpPr>
-            <a:spLocks noGrp="1" noRot="1" noChangeAspect="1"/>
-          </p:cNvSpPr>
-          <p:nvPr>
-            <p:ph type="sldImg"/>
-          </p:nvPr>
-        </p:nvSpPr>
-        <p:spPr/>
-      </p:sp>
-      <p:sp>
-        <p:nvSpPr>
-          <p:cNvPr id="3" name="Notes Placeholder 2"/>
-          <p:cNvSpPr>
-            <a:spLocks noGrp="1"/>
-          </p:cNvSpPr>
-          <p:nvPr>
-            <p:ph type="body" idx="1"/>
-          </p:nvPr>
-        </p:nvSpPr>
-        <p:spPr/>
-        <p:txBody>
-          <a:bodyPr/>
-          <a:lstStyle/>
-          <a:p>
-            <a:endParaRPr lang="en-US" dirty="0"/>
-          </a:p>
-        </p:txBody>
-      </p:sp>
-      <p:sp>
-        <p:nvSpPr>
-          <p:cNvPr id="4" name="Slide Number Placeholder 3"/>
-          <p:cNvSpPr>
-            <a:spLocks noGrp="1"/>
-          </p:cNvSpPr>
-          <p:nvPr>
-            <p:ph type="sldNum" sz="quarter" idx="10"/>
-          </p:nvPr>
-        </p:nvSpPr>
-        <p:spPr/>
-        <p:txBody>
-          <a:bodyPr/>
-          <a:lstStyle/>
-          <a:p>
-            <a:fld id="{F643181A-FD5F-E940-B6DC-320B23DAA7AA}" type="slidenum">
-              <a:rPr lang="en-US" smtClean="0"/>
-              <a:t>16</a:t>
-            </a:fld>
-            <a:endParaRPr lang="en-US"/>
-          </a:p>
-        </p:txBody>
-      </p:sp>
-    </p:spTree>
-    <p:extLst>
-      <p:ext uri="{BB962C8B-B14F-4D97-AF65-F5344CB8AC3E}">
-        <p14:creationId xmlns:p14="http://schemas.microsoft.com/office/powerpoint/2010/main" val="147813387"/>
-      </p:ext>
-    </p:extLst>
-  </p:cSld>
-  <p:clrMapOvr>
-    <a:masterClrMapping/>
-  </p:clrMapOvr>
-</p:notes>
-</file>
-
-<file path=ppt/notesSlides/notesSlide17.xml><?xml version="1.0" encoding="utf-8"?>
-<p:notes xmlns:a="http://schemas.openxmlformats.org/drawingml/2006/main" xmlns:r="http://schemas.openxmlformats.org/officeDocument/2006/relationships" xmlns:p="http://schemas.openxmlformats.org/presentationml/2006/main">
-  <p:cSld>
-    <p:spTree>
-      <p:nvGrpSpPr>
-        <p:cNvPr id="1" name=""/>
-        <p:cNvGrpSpPr/>
-        <p:nvPr/>
-      </p:nvGrpSpPr>
-      <p:grpSpPr>
-        <a:xfrm>
-          <a:off x="0" y="0"/>
-          <a:ext cx="0" cy="0"/>
-          <a:chOff x="0" y="0"/>
-          <a:chExt cx="0" cy="0"/>
-        </a:xfrm>
-      </p:grpSpPr>
-      <p:sp>
-        <p:nvSpPr>
-          <p:cNvPr id="2" name="Slide Image Placeholder 1"/>
-          <p:cNvSpPr>
-            <a:spLocks noGrp="1" noRot="1" noChangeAspect="1"/>
-          </p:cNvSpPr>
-          <p:nvPr>
-            <p:ph type="sldImg"/>
-          </p:nvPr>
-        </p:nvSpPr>
-        <p:spPr/>
-      </p:sp>
-      <p:sp>
-        <p:nvSpPr>
-          <p:cNvPr id="3" name="Notes Placeholder 2"/>
-          <p:cNvSpPr>
-            <a:spLocks noGrp="1"/>
-          </p:cNvSpPr>
-          <p:nvPr>
-            <p:ph type="body" idx="1"/>
-          </p:nvPr>
-        </p:nvSpPr>
-        <p:spPr/>
-        <p:txBody>
-          <a:bodyPr/>
-          <a:lstStyle/>
-          <a:p>
-            <a:endParaRPr lang="en-US" dirty="0"/>
-          </a:p>
-        </p:txBody>
-      </p:sp>
-      <p:sp>
-        <p:nvSpPr>
-          <p:cNvPr id="4" name="Slide Number Placeholder 3"/>
-          <p:cNvSpPr>
-            <a:spLocks noGrp="1"/>
-          </p:cNvSpPr>
-          <p:nvPr>
-            <p:ph type="sldNum" sz="quarter" idx="10"/>
-          </p:nvPr>
-        </p:nvSpPr>
-        <p:spPr/>
-        <p:txBody>
-          <a:bodyPr/>
-          <a:lstStyle/>
-          <a:p>
-            <a:fld id="{F643181A-FD5F-E940-B6DC-320B23DAA7AA}" type="slidenum">
-              <a:rPr lang="en-US" smtClean="0"/>
-              <a:t>17</a:t>
-            </a:fld>
-            <a:endParaRPr lang="en-US"/>
-          </a:p>
-        </p:txBody>
-      </p:sp>
-    </p:spTree>
-    <p:extLst>
-      <p:ext uri="{BB962C8B-B14F-4D97-AF65-F5344CB8AC3E}">
-        <p14:creationId xmlns:p14="http://schemas.microsoft.com/office/powerpoint/2010/main" val="147813387"/>
-      </p:ext>
-    </p:extLst>
-  </p:cSld>
-  <p:clrMapOvr>
-    <a:masterClrMapping/>
-  </p:clrMapOvr>
-</p:notes>
-</file>
-
-<file path=ppt/notesSlides/notesSlide18.xml><?xml version="1.0" encoding="utf-8"?>
-<p:notes xmlns:a="http://schemas.openxmlformats.org/drawingml/2006/main" xmlns:r="http://schemas.openxmlformats.org/officeDocument/2006/relationships" xmlns:p="http://schemas.openxmlformats.org/presentationml/2006/main">
-  <p:cSld>
-    <p:spTree>
-      <p:nvGrpSpPr>
-        <p:cNvPr id="1" name=""/>
-        <p:cNvGrpSpPr/>
-        <p:nvPr/>
-      </p:nvGrpSpPr>
-      <p:grpSpPr>
-        <a:xfrm>
-          <a:off x="0" y="0"/>
-          <a:ext cx="0" cy="0"/>
-          <a:chOff x="0" y="0"/>
-          <a:chExt cx="0" cy="0"/>
-        </a:xfrm>
-      </p:grpSpPr>
-      <p:sp>
-        <p:nvSpPr>
-          <p:cNvPr id="2" name="Slide Image Placeholder 1"/>
-          <p:cNvSpPr>
-            <a:spLocks noGrp="1" noRot="1" noChangeAspect="1"/>
-          </p:cNvSpPr>
-          <p:nvPr>
-            <p:ph type="sldImg"/>
-          </p:nvPr>
-        </p:nvSpPr>
-        <p:spPr/>
-      </p:sp>
-      <p:sp>
-        <p:nvSpPr>
-          <p:cNvPr id="3" name="Notes Placeholder 2"/>
-          <p:cNvSpPr>
-            <a:spLocks noGrp="1"/>
-          </p:cNvSpPr>
-          <p:nvPr>
-            <p:ph type="body" idx="1"/>
-          </p:nvPr>
-        </p:nvSpPr>
-        <p:spPr/>
-        <p:txBody>
-          <a:bodyPr/>
-          <a:lstStyle/>
-          <a:p>
-            <a:endParaRPr lang="en-US" dirty="0"/>
-          </a:p>
-        </p:txBody>
-      </p:sp>
-      <p:sp>
-        <p:nvSpPr>
-          <p:cNvPr id="4" name="Slide Number Placeholder 3"/>
-          <p:cNvSpPr>
-            <a:spLocks noGrp="1"/>
-          </p:cNvSpPr>
-          <p:nvPr>
-            <p:ph type="sldNum" sz="quarter" idx="10"/>
-          </p:nvPr>
-        </p:nvSpPr>
-        <p:spPr/>
-        <p:txBody>
-          <a:bodyPr/>
-          <a:lstStyle/>
-          <a:p>
-            <a:fld id="{F643181A-FD5F-E940-B6DC-320B23DAA7AA}" type="slidenum">
-              <a:rPr lang="en-US" smtClean="0"/>
-              <a:t>18</a:t>
-            </a:fld>
-            <a:endParaRPr lang="en-US"/>
-          </a:p>
-        </p:txBody>
-      </p:sp>
-    </p:spTree>
-    <p:extLst>
-      <p:ext uri="{BB962C8B-B14F-4D97-AF65-F5344CB8AC3E}">
-        <p14:creationId xmlns:p14="http://schemas.microsoft.com/office/powerpoint/2010/main" val="147813387"/>
-      </p:ext>
-    </p:extLst>
-  </p:cSld>
-  <p:clrMapOvr>
-    <a:masterClrMapping/>
-  </p:clrMapOvr>
-</p:notes>
-</file>
-
-<file path=ppt/notesSlides/notesSlide19.xml><?xml version="1.0" encoding="utf-8"?>
-<p:notes xmlns:a="http://schemas.openxmlformats.org/drawingml/2006/main" xmlns:r="http://schemas.openxmlformats.org/officeDocument/2006/relationships" xmlns:p="http://schemas.openxmlformats.org/presentationml/2006/main">
-  <p:cSld>
-    <p:spTree>
-      <p:nvGrpSpPr>
-        <p:cNvPr id="1" name=""/>
-        <p:cNvGrpSpPr/>
-        <p:nvPr/>
-      </p:nvGrpSpPr>
-      <p:grpSpPr>
-        <a:xfrm>
-          <a:off x="0" y="0"/>
-          <a:ext cx="0" cy="0"/>
-          <a:chOff x="0" y="0"/>
-          <a:chExt cx="0" cy="0"/>
-        </a:xfrm>
-      </p:grpSpPr>
-      <p:sp>
-        <p:nvSpPr>
-          <p:cNvPr id="2" name="Slide Image Placeholder 1"/>
-          <p:cNvSpPr>
-            <a:spLocks noGrp="1" noRot="1" noChangeAspect="1"/>
-          </p:cNvSpPr>
-          <p:nvPr>
-            <p:ph type="sldImg"/>
-          </p:nvPr>
-        </p:nvSpPr>
-        <p:spPr/>
-      </p:sp>
-      <p:sp>
-        <p:nvSpPr>
-          <p:cNvPr id="3" name="Notes Placeholder 2"/>
-          <p:cNvSpPr>
-            <a:spLocks noGrp="1"/>
-          </p:cNvSpPr>
-          <p:nvPr>
-            <p:ph type="body" idx="1"/>
-          </p:nvPr>
-        </p:nvSpPr>
-        <p:spPr/>
-        <p:txBody>
-          <a:bodyPr/>
-          <a:lstStyle/>
-          <a:p>
-            <a:endParaRPr lang="en-US" dirty="0"/>
-          </a:p>
-        </p:txBody>
-      </p:sp>
-      <p:sp>
-        <p:nvSpPr>
-          <p:cNvPr id="4" name="Slide Number Placeholder 3"/>
-          <p:cNvSpPr>
-            <a:spLocks noGrp="1"/>
-          </p:cNvSpPr>
-          <p:nvPr>
-            <p:ph type="sldNum" sz="quarter" idx="10"/>
-          </p:nvPr>
-        </p:nvSpPr>
-        <p:spPr/>
-        <p:txBody>
-          <a:bodyPr/>
-          <a:lstStyle/>
-          <a:p>
-            <a:fld id="{F643181A-FD5F-E940-B6DC-320B23DAA7AA}" type="slidenum">
-              <a:rPr lang="en-US" smtClean="0"/>
-              <a:t>19</a:t>
             </a:fld>
             <a:endParaRPr lang="en-US"/>
           </a:p>
@@ -1469,12 +1011,13 @@
           <a:p>
             <a:r>
               <a:rPr lang="en-US" dirty="0" smtClean="0"/>
-              <a:t>Image one:</a:t>
+              <a:t>Title</a:t>
             </a:r>
             <a:r>
               <a:rPr lang="en-US" baseline="0" dirty="0" smtClean="0"/>
-              <a:t> title page</a:t>
-            </a:r>
+              <a:t> age</a:t>
+            </a:r>
+            <a:endParaRPr lang="en-US" baseline="0" dirty="0" smtClean="0"/>
           </a:p>
           <a:p>
             <a:r>
@@ -1487,7 +1030,7 @@
             </a:r>
             <a:r>
               <a:rPr lang="en-US" baseline="0" dirty="0" smtClean="0"/>
-              <a:t>: a frontispiece, not common with </a:t>
+              <a:t>: this is not a frontispiece, not common with </a:t>
             </a:r>
             <a:r>
               <a:rPr lang="en-US" baseline="0" dirty="0" err="1" smtClean="0"/>
@@ -1526,7 +1069,7 @@
           <a:p>
             <a:fld id="{F643181A-FD5F-E940-B6DC-320B23DAA7AA}" type="slidenum">
               <a:rPr lang="en-US" smtClean="0"/>
-              <a:t>2</a:t>
+              <a:t>3</a:t>
             </a:fld>
             <a:endParaRPr lang="en-US"/>
           </a:p>
@@ -1536,426 +1079,6 @@
     <p:extLst>
       <p:ext uri="{BB962C8B-B14F-4D97-AF65-F5344CB8AC3E}">
         <p14:creationId xmlns:p14="http://schemas.microsoft.com/office/powerpoint/2010/main" val="2995728640"/>
-      </p:ext>
-    </p:extLst>
-  </p:cSld>
-  <p:clrMapOvr>
-    <a:masterClrMapping/>
-  </p:clrMapOvr>
-</p:notes>
-</file>
-
-<file path=ppt/notesSlides/notesSlide20.xml><?xml version="1.0" encoding="utf-8"?>
-<p:notes xmlns:a="http://schemas.openxmlformats.org/drawingml/2006/main" xmlns:r="http://schemas.openxmlformats.org/officeDocument/2006/relationships" xmlns:p="http://schemas.openxmlformats.org/presentationml/2006/main">
-  <p:cSld>
-    <p:spTree>
-      <p:nvGrpSpPr>
-        <p:cNvPr id="1" name=""/>
-        <p:cNvGrpSpPr/>
-        <p:nvPr/>
-      </p:nvGrpSpPr>
-      <p:grpSpPr>
-        <a:xfrm>
-          <a:off x="0" y="0"/>
-          <a:ext cx="0" cy="0"/>
-          <a:chOff x="0" y="0"/>
-          <a:chExt cx="0" cy="0"/>
-        </a:xfrm>
-      </p:grpSpPr>
-      <p:sp>
-        <p:nvSpPr>
-          <p:cNvPr id="2" name="Slide Image Placeholder 1"/>
-          <p:cNvSpPr>
-            <a:spLocks noGrp="1" noRot="1" noChangeAspect="1"/>
-          </p:cNvSpPr>
-          <p:nvPr>
-            <p:ph type="sldImg"/>
-          </p:nvPr>
-        </p:nvSpPr>
-        <p:spPr/>
-      </p:sp>
-      <p:sp>
-        <p:nvSpPr>
-          <p:cNvPr id="3" name="Notes Placeholder 2"/>
-          <p:cNvSpPr>
-            <a:spLocks noGrp="1"/>
-          </p:cNvSpPr>
-          <p:nvPr>
-            <p:ph type="body" idx="1"/>
-          </p:nvPr>
-        </p:nvSpPr>
-        <p:spPr/>
-        <p:txBody>
-          <a:bodyPr/>
-          <a:lstStyle/>
-          <a:p>
-            <a:endParaRPr lang="en-US" dirty="0"/>
-          </a:p>
-        </p:txBody>
-      </p:sp>
-      <p:sp>
-        <p:nvSpPr>
-          <p:cNvPr id="4" name="Slide Number Placeholder 3"/>
-          <p:cNvSpPr>
-            <a:spLocks noGrp="1"/>
-          </p:cNvSpPr>
-          <p:nvPr>
-            <p:ph type="sldNum" sz="quarter" idx="10"/>
-          </p:nvPr>
-        </p:nvSpPr>
-        <p:spPr/>
-        <p:txBody>
-          <a:bodyPr/>
-          <a:lstStyle/>
-          <a:p>
-            <a:fld id="{F643181A-FD5F-E940-B6DC-320B23DAA7AA}" type="slidenum">
-              <a:rPr lang="en-US" smtClean="0"/>
-              <a:t>20</a:t>
-            </a:fld>
-            <a:endParaRPr lang="en-US"/>
-          </a:p>
-        </p:txBody>
-      </p:sp>
-    </p:spTree>
-    <p:extLst>
-      <p:ext uri="{BB962C8B-B14F-4D97-AF65-F5344CB8AC3E}">
-        <p14:creationId xmlns:p14="http://schemas.microsoft.com/office/powerpoint/2010/main" val="147813387"/>
-      </p:ext>
-    </p:extLst>
-  </p:cSld>
-  <p:clrMapOvr>
-    <a:masterClrMapping/>
-  </p:clrMapOvr>
-</p:notes>
-</file>
-
-<file path=ppt/notesSlides/notesSlide21.xml><?xml version="1.0" encoding="utf-8"?>
-<p:notes xmlns:a="http://schemas.openxmlformats.org/drawingml/2006/main" xmlns:r="http://schemas.openxmlformats.org/officeDocument/2006/relationships" xmlns:p="http://schemas.openxmlformats.org/presentationml/2006/main">
-  <p:cSld>
-    <p:spTree>
-      <p:nvGrpSpPr>
-        <p:cNvPr id="1" name=""/>
-        <p:cNvGrpSpPr/>
-        <p:nvPr/>
-      </p:nvGrpSpPr>
-      <p:grpSpPr>
-        <a:xfrm>
-          <a:off x="0" y="0"/>
-          <a:ext cx="0" cy="0"/>
-          <a:chOff x="0" y="0"/>
-          <a:chExt cx="0" cy="0"/>
-        </a:xfrm>
-      </p:grpSpPr>
-      <p:sp>
-        <p:nvSpPr>
-          <p:cNvPr id="2" name="Slide Image Placeholder 1"/>
-          <p:cNvSpPr>
-            <a:spLocks noGrp="1" noRot="1" noChangeAspect="1"/>
-          </p:cNvSpPr>
-          <p:nvPr>
-            <p:ph type="sldImg"/>
-          </p:nvPr>
-        </p:nvSpPr>
-        <p:spPr/>
-      </p:sp>
-      <p:sp>
-        <p:nvSpPr>
-          <p:cNvPr id="3" name="Notes Placeholder 2"/>
-          <p:cNvSpPr>
-            <a:spLocks noGrp="1"/>
-          </p:cNvSpPr>
-          <p:nvPr>
-            <p:ph type="body" idx="1"/>
-          </p:nvPr>
-        </p:nvSpPr>
-        <p:spPr/>
-        <p:txBody>
-          <a:bodyPr/>
-          <a:lstStyle/>
-          <a:p>
-            <a:endParaRPr lang="en-US" dirty="0"/>
-          </a:p>
-        </p:txBody>
-      </p:sp>
-      <p:sp>
-        <p:nvSpPr>
-          <p:cNvPr id="4" name="Slide Number Placeholder 3"/>
-          <p:cNvSpPr>
-            <a:spLocks noGrp="1"/>
-          </p:cNvSpPr>
-          <p:nvPr>
-            <p:ph type="sldNum" sz="quarter" idx="10"/>
-          </p:nvPr>
-        </p:nvSpPr>
-        <p:spPr/>
-        <p:txBody>
-          <a:bodyPr/>
-          <a:lstStyle/>
-          <a:p>
-            <a:fld id="{F643181A-FD5F-E940-B6DC-320B23DAA7AA}" type="slidenum">
-              <a:rPr lang="en-US" smtClean="0"/>
-              <a:t>21</a:t>
-            </a:fld>
-            <a:endParaRPr lang="en-US"/>
-          </a:p>
-        </p:txBody>
-      </p:sp>
-    </p:spTree>
-    <p:extLst>
-      <p:ext uri="{BB962C8B-B14F-4D97-AF65-F5344CB8AC3E}">
-        <p14:creationId xmlns:p14="http://schemas.microsoft.com/office/powerpoint/2010/main" val="147813387"/>
-      </p:ext>
-    </p:extLst>
-  </p:cSld>
-  <p:clrMapOvr>
-    <a:masterClrMapping/>
-  </p:clrMapOvr>
-</p:notes>
-</file>
-
-<file path=ppt/notesSlides/notesSlide22.xml><?xml version="1.0" encoding="utf-8"?>
-<p:notes xmlns:a="http://schemas.openxmlformats.org/drawingml/2006/main" xmlns:r="http://schemas.openxmlformats.org/officeDocument/2006/relationships" xmlns:p="http://schemas.openxmlformats.org/presentationml/2006/main">
-  <p:cSld>
-    <p:spTree>
-      <p:nvGrpSpPr>
-        <p:cNvPr id="1" name=""/>
-        <p:cNvGrpSpPr/>
-        <p:nvPr/>
-      </p:nvGrpSpPr>
-      <p:grpSpPr>
-        <a:xfrm>
-          <a:off x="0" y="0"/>
-          <a:ext cx="0" cy="0"/>
-          <a:chOff x="0" y="0"/>
-          <a:chExt cx="0" cy="0"/>
-        </a:xfrm>
-      </p:grpSpPr>
-      <p:sp>
-        <p:nvSpPr>
-          <p:cNvPr id="2" name="Slide Image Placeholder 1"/>
-          <p:cNvSpPr>
-            <a:spLocks noGrp="1" noRot="1" noChangeAspect="1"/>
-          </p:cNvSpPr>
-          <p:nvPr>
-            <p:ph type="sldImg"/>
-          </p:nvPr>
-        </p:nvSpPr>
-        <p:spPr/>
-      </p:sp>
-      <p:sp>
-        <p:nvSpPr>
-          <p:cNvPr id="3" name="Notes Placeholder 2"/>
-          <p:cNvSpPr>
-            <a:spLocks noGrp="1"/>
-          </p:cNvSpPr>
-          <p:nvPr>
-            <p:ph type="body" idx="1"/>
-          </p:nvPr>
-        </p:nvSpPr>
-        <p:spPr/>
-        <p:txBody>
-          <a:bodyPr/>
-          <a:lstStyle/>
-          <a:p>
-            <a:endParaRPr lang="en-US" dirty="0"/>
-          </a:p>
-        </p:txBody>
-      </p:sp>
-      <p:sp>
-        <p:nvSpPr>
-          <p:cNvPr id="4" name="Slide Number Placeholder 3"/>
-          <p:cNvSpPr>
-            <a:spLocks noGrp="1"/>
-          </p:cNvSpPr>
-          <p:nvPr>
-            <p:ph type="sldNum" sz="quarter" idx="10"/>
-          </p:nvPr>
-        </p:nvSpPr>
-        <p:spPr/>
-        <p:txBody>
-          <a:bodyPr/>
-          <a:lstStyle/>
-          <a:p>
-            <a:fld id="{F643181A-FD5F-E940-B6DC-320B23DAA7AA}" type="slidenum">
-              <a:rPr lang="en-US" smtClean="0"/>
-              <a:t>22</a:t>
-            </a:fld>
-            <a:endParaRPr lang="en-US"/>
-          </a:p>
-        </p:txBody>
-      </p:sp>
-    </p:spTree>
-    <p:extLst>
-      <p:ext uri="{BB962C8B-B14F-4D97-AF65-F5344CB8AC3E}">
-        <p14:creationId xmlns:p14="http://schemas.microsoft.com/office/powerpoint/2010/main" val="147813387"/>
-      </p:ext>
-    </p:extLst>
-  </p:cSld>
-  <p:clrMapOvr>
-    <a:masterClrMapping/>
-  </p:clrMapOvr>
-</p:notes>
-</file>
-
-<file path=ppt/notesSlides/notesSlide23.xml><?xml version="1.0" encoding="utf-8"?>
-<p:notes xmlns:a="http://schemas.openxmlformats.org/drawingml/2006/main" xmlns:r="http://schemas.openxmlformats.org/officeDocument/2006/relationships" xmlns:p="http://schemas.openxmlformats.org/presentationml/2006/main">
-  <p:cSld>
-    <p:spTree>
-      <p:nvGrpSpPr>
-        <p:cNvPr id="1" name=""/>
-        <p:cNvGrpSpPr/>
-        <p:nvPr/>
-      </p:nvGrpSpPr>
-      <p:grpSpPr>
-        <a:xfrm>
-          <a:off x="0" y="0"/>
-          <a:ext cx="0" cy="0"/>
-          <a:chOff x="0" y="0"/>
-          <a:chExt cx="0" cy="0"/>
-        </a:xfrm>
-      </p:grpSpPr>
-      <p:sp>
-        <p:nvSpPr>
-          <p:cNvPr id="2" name="Slide Image Placeholder 1"/>
-          <p:cNvSpPr>
-            <a:spLocks noGrp="1" noRot="1" noChangeAspect="1"/>
-          </p:cNvSpPr>
-          <p:nvPr>
-            <p:ph type="sldImg"/>
-          </p:nvPr>
-        </p:nvSpPr>
-        <p:spPr/>
-      </p:sp>
-      <p:sp>
-        <p:nvSpPr>
-          <p:cNvPr id="3" name="Notes Placeholder 2"/>
-          <p:cNvSpPr>
-            <a:spLocks noGrp="1"/>
-          </p:cNvSpPr>
-          <p:nvPr>
-            <p:ph type="body" idx="1"/>
-          </p:nvPr>
-        </p:nvSpPr>
-        <p:spPr/>
-        <p:txBody>
-          <a:bodyPr/>
-          <a:lstStyle/>
-          <a:p>
-            <a:endParaRPr lang="en-US" dirty="0"/>
-          </a:p>
-        </p:txBody>
-      </p:sp>
-      <p:sp>
-        <p:nvSpPr>
-          <p:cNvPr id="4" name="Slide Number Placeholder 3"/>
-          <p:cNvSpPr>
-            <a:spLocks noGrp="1"/>
-          </p:cNvSpPr>
-          <p:nvPr>
-            <p:ph type="sldNum" sz="quarter" idx="10"/>
-          </p:nvPr>
-        </p:nvSpPr>
-        <p:spPr/>
-        <p:txBody>
-          <a:bodyPr/>
-          <a:lstStyle/>
-          <a:p>
-            <a:fld id="{F643181A-FD5F-E940-B6DC-320B23DAA7AA}" type="slidenum">
-              <a:rPr lang="en-US" smtClean="0"/>
-              <a:t>23</a:t>
-            </a:fld>
-            <a:endParaRPr lang="en-US"/>
-          </a:p>
-        </p:txBody>
-      </p:sp>
-    </p:spTree>
-    <p:extLst>
-      <p:ext uri="{BB962C8B-B14F-4D97-AF65-F5344CB8AC3E}">
-        <p14:creationId xmlns:p14="http://schemas.microsoft.com/office/powerpoint/2010/main" val="147813387"/>
-      </p:ext>
-    </p:extLst>
-  </p:cSld>
-  <p:clrMapOvr>
-    <a:masterClrMapping/>
-  </p:clrMapOvr>
-</p:notes>
-</file>
-
-<file path=ppt/notesSlides/notesSlide24.xml><?xml version="1.0" encoding="utf-8"?>
-<p:notes xmlns:a="http://schemas.openxmlformats.org/drawingml/2006/main" xmlns:r="http://schemas.openxmlformats.org/officeDocument/2006/relationships" xmlns:p="http://schemas.openxmlformats.org/presentationml/2006/main">
-  <p:cSld>
-    <p:spTree>
-      <p:nvGrpSpPr>
-        <p:cNvPr id="1" name=""/>
-        <p:cNvGrpSpPr/>
-        <p:nvPr/>
-      </p:nvGrpSpPr>
-      <p:grpSpPr>
-        <a:xfrm>
-          <a:off x="0" y="0"/>
-          <a:ext cx="0" cy="0"/>
-          <a:chOff x="0" y="0"/>
-          <a:chExt cx="0" cy="0"/>
-        </a:xfrm>
-      </p:grpSpPr>
-      <p:sp>
-        <p:nvSpPr>
-          <p:cNvPr id="2" name="Slide Image Placeholder 1"/>
-          <p:cNvSpPr>
-            <a:spLocks noGrp="1" noRot="1" noChangeAspect="1"/>
-          </p:cNvSpPr>
-          <p:nvPr>
-            <p:ph type="sldImg"/>
-          </p:nvPr>
-        </p:nvSpPr>
-        <p:spPr/>
-      </p:sp>
-      <p:sp>
-        <p:nvSpPr>
-          <p:cNvPr id="3" name="Notes Placeholder 2"/>
-          <p:cNvSpPr>
-            <a:spLocks noGrp="1"/>
-          </p:cNvSpPr>
-          <p:nvPr>
-            <p:ph type="body" idx="1"/>
-          </p:nvPr>
-        </p:nvSpPr>
-        <p:spPr/>
-        <p:txBody>
-          <a:bodyPr/>
-          <a:lstStyle/>
-          <a:p>
-            <a:endParaRPr lang="en-US" dirty="0"/>
-          </a:p>
-        </p:txBody>
-      </p:sp>
-      <p:sp>
-        <p:nvSpPr>
-          <p:cNvPr id="4" name="Slide Number Placeholder 3"/>
-          <p:cNvSpPr>
-            <a:spLocks noGrp="1"/>
-          </p:cNvSpPr>
-          <p:nvPr>
-            <p:ph type="sldNum" sz="quarter" idx="10"/>
-          </p:nvPr>
-        </p:nvSpPr>
-        <p:spPr/>
-        <p:txBody>
-          <a:bodyPr/>
-          <a:lstStyle/>
-          <a:p>
-            <a:fld id="{F643181A-FD5F-E940-B6DC-320B23DAA7AA}" type="slidenum">
-              <a:rPr lang="en-US" smtClean="0"/>
-              <a:t>24</a:t>
-            </a:fld>
-            <a:endParaRPr lang="en-US"/>
-          </a:p>
-        </p:txBody>
-      </p:sp>
-    </p:spTree>
-    <p:extLst>
-      <p:ext uri="{BB962C8B-B14F-4D97-AF65-F5344CB8AC3E}">
-        <p14:creationId xmlns:p14="http://schemas.microsoft.com/office/powerpoint/2010/main" val="147813387"/>
       </p:ext>
     </p:extLst>
   </p:cSld>
@@ -2011,7 +1134,11 @@
           <a:p>
             <a:r>
               <a:rPr lang="en-US" dirty="0" smtClean="0"/>
-              <a:t>Image Two. Beginning of </a:t>
+              <a:t>Beginning </a:t>
+            </a:r>
+            <a:r>
+              <a:rPr lang="en-US" dirty="0" smtClean="0"/>
+              <a:t>of </a:t>
             </a:r>
             <a:r>
               <a:rPr lang="en-US" dirty="0" err="1" smtClean="0"/>
@@ -2046,7 +1173,7 @@
           <a:p>
             <a:fld id="{F643181A-FD5F-E940-B6DC-320B23DAA7AA}" type="slidenum">
               <a:rPr lang="en-US" smtClean="0"/>
-              <a:t>3</a:t>
+              <a:t>4</a:t>
             </a:fld>
             <a:endParaRPr lang="en-US"/>
           </a:p>
@@ -2111,7 +1238,7 @@
           <a:p>
             <a:r>
               <a:rPr lang="en-US" dirty="0" smtClean="0"/>
-              <a:t>Image Three: special symbols</a:t>
+              <a:t>Special symbols</a:t>
             </a:r>
             <a:endParaRPr lang="en-US" dirty="0"/>
           </a:p>
@@ -2134,7 +1261,7 @@
           <a:p>
             <a:fld id="{F643181A-FD5F-E940-B6DC-320B23DAA7AA}" type="slidenum">
               <a:rPr lang="en-US" smtClean="0"/>
-              <a:t>4</a:t>
+              <a:t>5</a:t>
             </a:fld>
             <a:endParaRPr lang="en-US"/>
           </a:p>
@@ -2199,8 +1326,9 @@
           <a:p>
             <a:r>
               <a:rPr lang="en-US" dirty="0" smtClean="0"/>
-              <a:t>Image Four: punctuation</a:t>
-            </a:r>
+              <a:t>Punctuation</a:t>
+            </a:r>
+            <a:endParaRPr lang="en-US" dirty="0" smtClean="0"/>
           </a:p>
           <a:p>
             <a:endParaRPr lang="en-US" dirty="0" smtClean="0"/>
@@ -2263,7 +1391,7 @@
           <a:p>
             <a:fld id="{F643181A-FD5F-E940-B6DC-320B23DAA7AA}" type="slidenum">
               <a:rPr lang="en-US" smtClean="0"/>
-              <a:t>5</a:t>
+              <a:t>6</a:t>
             </a:fld>
             <a:endParaRPr lang="en-US"/>
           </a:p>
@@ -2326,6 +1454,58 @@
           <a:bodyPr/>
           <a:lstStyle/>
           <a:p>
+            <a:r>
+              <a:rPr lang="en-US" dirty="0" smtClean="0"/>
+              <a:t>Influenced by Pedro S</a:t>
+            </a:r>
+            <a:r>
+              <a:rPr lang="en-US" dirty="0" smtClean="0"/>
+              <a:t>ánchez-</a:t>
+            </a:r>
+            <a:r>
+              <a:rPr lang="en-US" dirty="0" err="1" smtClean="0"/>
+              <a:t>Prieto</a:t>
+            </a:r>
+            <a:r>
+              <a:rPr lang="en-US" dirty="0" smtClean="0"/>
+              <a:t> </a:t>
+            </a:r>
+            <a:r>
+              <a:rPr lang="en-US" dirty="0" err="1" smtClean="0"/>
+              <a:t>Borja</a:t>
+            </a:r>
+            <a:r>
+              <a:rPr lang="en-US" dirty="0" smtClean="0"/>
+              <a:t>, </a:t>
+            </a:r>
+            <a:r>
+              <a:rPr lang="en-US" i="1" dirty="0" err="1" smtClean="0"/>
+              <a:t>Cómo</a:t>
+            </a:r>
+            <a:r>
+              <a:rPr lang="en-US" i="1" dirty="0" smtClean="0"/>
+              <a:t> </a:t>
+            </a:r>
+            <a:r>
+              <a:rPr lang="en-US" i="1" dirty="0" err="1" smtClean="0"/>
+              <a:t>editar</a:t>
+            </a:r>
+            <a:r>
+              <a:rPr lang="en-US" i="1" dirty="0" smtClean="0"/>
+              <a:t> los </a:t>
+            </a:r>
+            <a:r>
+              <a:rPr lang="en-US" i="1" dirty="0" err="1" smtClean="0"/>
+              <a:t>textos</a:t>
+            </a:r>
+            <a:r>
+              <a:rPr lang="en-US" i="1" dirty="0" smtClean="0"/>
+              <a:t> </a:t>
+            </a:r>
+            <a:r>
+              <a:rPr lang="en-US" i="1" smtClean="0"/>
+              <a:t>medievales</a:t>
+            </a:r>
             <a:endParaRPr lang="en-US" dirty="0"/>
           </a:p>
         </p:txBody>
@@ -2347,7 +1527,7 @@
           <a:p>
             <a:fld id="{F643181A-FD5F-E940-B6DC-320B23DAA7AA}" type="slidenum">
               <a:rPr lang="en-US" smtClean="0"/>
-              <a:t>6</a:t>
+              <a:t>7</a:t>
             </a:fld>
             <a:endParaRPr lang="en-US"/>
           </a:p>
@@ -2412,7 +1592,35 @@
           <a:p>
             <a:r>
               <a:rPr lang="en-US" dirty="0" smtClean="0"/>
-              <a:t>Image 6: Southey’s internal divisions. From Chapter 1, in</a:t>
+              <a:t>From Southey’s 1803 edition of </a:t>
+            </a:r>
+            <a:r>
+              <a:rPr lang="en-US" dirty="0" err="1" smtClean="0"/>
+              <a:t>Amad</a:t>
+            </a:r>
+            <a:r>
+              <a:rPr lang="en-US" dirty="0" err="1" smtClean="0"/>
+              <a:t>ís</a:t>
+            </a:r>
+            <a:r>
+              <a:rPr lang="en-US" dirty="0" smtClean="0"/>
+              <a:t>, sourced from </a:t>
+            </a:r>
+            <a:r>
+              <a:rPr lang="en-US" dirty="0" err="1" smtClean="0"/>
+              <a:t>Hathi</a:t>
+            </a:r>
+            <a:r>
+              <a:rPr lang="en-US" dirty="0" smtClean="0"/>
+              <a:t> Trust. Shows </a:t>
+            </a:r>
+            <a:r>
+              <a:rPr lang="en-US" dirty="0" smtClean="0"/>
+              <a:t>Southey’s </a:t>
+            </a:r>
+            <a:r>
+              <a:rPr lang="en-US" dirty="0" smtClean="0"/>
+              <a:t>internal divisions. From Chapter 1, in</a:t>
             </a:r>
             <a:r>
               <a:rPr lang="en-US" baseline="0" dirty="0" smtClean="0"/>
@@ -2420,7 +1628,11 @@
             </a:r>
             <a:r>
               <a:rPr lang="en-US" baseline="0" dirty="0" err="1" smtClean="0"/>
-              <a:t>MOntalvo</a:t>
+              <a:t>Montalvo</a:t>
+            </a:r>
+            <a:r>
+              <a:rPr lang="en-US" baseline="0" dirty="0" smtClean="0"/>
+              <a:t>. Go back to slide 6: we can see how Southey has taken into account, at least as a baseline, the 1547 punctuation.</a:t>
             </a:r>
             <a:endParaRPr lang="en-US" dirty="0"/>
           </a:p>
@@ -2443,7 +1655,7 @@
           <a:p>
             <a:fld id="{F643181A-FD5F-E940-B6DC-320B23DAA7AA}" type="slidenum">
               <a:rPr lang="en-US" smtClean="0"/>
-              <a:t>7</a:t>
+              <a:t>8</a:t>
             </a:fld>
             <a:endParaRPr lang="en-US"/>
           </a:p>
@@ -2508,7 +1720,11 @@
           <a:p>
             <a:r>
               <a:rPr lang="en-US" dirty="0" smtClean="0"/>
-              <a:t>Image 7: Corresponds to the same passage of text as in the previous Southey</a:t>
+              <a:t>Corresponds </a:t>
+            </a:r>
+            <a:r>
+              <a:rPr lang="en-US" dirty="0" smtClean="0"/>
+              <a:t>to the same passage of text as in the previous Southey</a:t>
             </a:r>
             <a:r>
               <a:rPr lang="en-US" baseline="0" dirty="0" smtClean="0"/>
@@ -2535,7 +1751,7 @@
           <a:p>
             <a:fld id="{F643181A-FD5F-E940-B6DC-320B23DAA7AA}" type="slidenum">
               <a:rPr lang="en-US" smtClean="0"/>
-              <a:t>8</a:t>
+              <a:t>9</a:t>
             </a:fld>
             <a:endParaRPr lang="en-US"/>
           </a:p>
@@ -2600,19 +1816,15 @@
           <a:p>
             <a:r>
               <a:rPr lang="en-US" dirty="0" smtClean="0"/>
-              <a:t>Image 8: </a:t>
+              <a:t>Alignment </a:t>
             </a:r>
             <a:r>
               <a:rPr lang="en-US" dirty="0" smtClean="0"/>
-              <a:t>Alignment coding: Southey</a:t>
+              <a:t>coding: Southey</a:t>
             </a:r>
             <a:r>
               <a:rPr lang="en-US" baseline="0" dirty="0" smtClean="0"/>
-              <a:t> aligned </a:t>
-            </a:r>
-            <a:r>
-              <a:rPr lang="en-US" baseline="0" dirty="0" smtClean="0"/>
-              <a:t>to </a:t>
+              <a:t> aligned to </a:t>
             </a:r>
             <a:r>
               <a:rPr lang="en-US" baseline="0" dirty="0" err="1" smtClean="0"/>
@@ -2620,11 +1832,7 @@
             </a:r>
             <a:r>
               <a:rPr lang="en-US" baseline="0" dirty="0" smtClean="0"/>
-              <a:t> with anchor </a:t>
-            </a:r>
-            <a:r>
-              <a:rPr lang="en-US" baseline="0" dirty="0" smtClean="0"/>
-              <a:t>tags. Reveals where texts match up and do not</a:t>
+              <a:t> with anchor tags. Reveals where texts match up and do not</a:t>
             </a:r>
             <a:endParaRPr lang="en-US" dirty="0"/>
           </a:p>
@@ -2647,7 +1855,7 @@
           <a:p>
             <a:fld id="{F643181A-FD5F-E940-B6DC-320B23DAA7AA}" type="slidenum">
               <a:rPr lang="en-US" smtClean="0"/>
-              <a:t>9</a:t>
+              <a:t>10</a:t>
             </a:fld>
             <a:endParaRPr lang="en-US"/>
           </a:p>
@@ -2854,7 +2062,7 @@
           <a:p>
             <a:fld id="{6BFECD78-3C8E-49F2-8FAB-59489D168ABB}" type="datetimeFigureOut">
               <a:rPr lang="en-US" smtClean="0"/>
-              <a:t>10/29/15</a:t>
+              <a:t>10/30/15</a:t>
             </a:fld>
             <a:endParaRPr lang="en-US"/>
           </a:p>
@@ -3055,7 +2263,7 @@
           <a:p>
             <a:fld id="{6BFECD78-3C8E-49F2-8FAB-59489D168ABB}" type="datetimeFigureOut">
               <a:rPr lang="en-US" smtClean="0"/>
-              <a:t>10/29/15</a:t>
+              <a:t>10/30/15</a:t>
             </a:fld>
             <a:endParaRPr lang="en-US"/>
           </a:p>
@@ -3230,7 +2438,7 @@
           <a:p>
             <a:fld id="{6BFECD78-3C8E-49F2-8FAB-59489D168ABB}" type="datetimeFigureOut">
               <a:rPr lang="en-US" smtClean="0"/>
-              <a:t>10/29/15</a:t>
+              <a:t>10/30/15</a:t>
             </a:fld>
             <a:endParaRPr lang="en-US"/>
           </a:p>
@@ -3395,7 +2603,7 @@
           <a:p>
             <a:fld id="{6BFECD78-3C8E-49F2-8FAB-59489D168ABB}" type="datetimeFigureOut">
               <a:rPr lang="en-US" smtClean="0"/>
-              <a:t>10/29/15</a:t>
+              <a:t>10/30/15</a:t>
             </a:fld>
             <a:endParaRPr lang="en-US"/>
           </a:p>
@@ -3643,7 +2851,7 @@
           <a:p>
             <a:fld id="{6BFECD78-3C8E-49F2-8FAB-59489D168ABB}" type="datetimeFigureOut">
               <a:rPr lang="en-US" smtClean="0"/>
-              <a:t>10/29/15</a:t>
+              <a:t>10/30/15</a:t>
             </a:fld>
             <a:endParaRPr lang="en-US"/>
           </a:p>
@@ -3961,7 +3169,7 @@
           <a:p>
             <a:fld id="{6BFECD78-3C8E-49F2-8FAB-59489D168ABB}" type="datetimeFigureOut">
               <a:rPr lang="en-US" smtClean="0"/>
-              <a:t>10/29/15</a:t>
+              <a:t>10/30/15</a:t>
             </a:fld>
             <a:endParaRPr lang="en-US"/>
           </a:p>
@@ -4427,7 +3635,7 @@
           <a:p>
             <a:fld id="{6BFECD78-3C8E-49F2-8FAB-59489D168ABB}" type="datetimeFigureOut">
               <a:rPr lang="en-US" smtClean="0"/>
-              <a:t>10/29/15</a:t>
+              <a:t>10/30/15</a:t>
             </a:fld>
             <a:endParaRPr lang="en-US"/>
           </a:p>
@@ -4575,7 +3783,7 @@
           <a:p>
             <a:fld id="{6BFECD78-3C8E-49F2-8FAB-59489D168ABB}" type="datetimeFigureOut">
               <a:rPr lang="en-US" smtClean="0"/>
-              <a:t>10/29/15</a:t>
+              <a:t>10/30/15</a:t>
             </a:fld>
             <a:endParaRPr lang="en-US"/>
           </a:p>
@@ -4665,7 +3873,7 @@
           <a:p>
             <a:fld id="{6BFECD78-3C8E-49F2-8FAB-59489D168ABB}" type="datetimeFigureOut">
               <a:rPr lang="en-US" smtClean="0"/>
-              <a:t>10/29/15</a:t>
+              <a:t>10/30/15</a:t>
             </a:fld>
             <a:endParaRPr lang="en-US"/>
           </a:p>
@@ -4939,7 +4147,7 @@
           <a:p>
             <a:fld id="{6BFECD78-3C8E-49F2-8FAB-59489D168ABB}" type="datetimeFigureOut">
               <a:rPr lang="en-US" smtClean="0"/>
-              <a:t>10/29/15</a:t>
+              <a:t>10/30/15</a:t>
             </a:fld>
             <a:endParaRPr lang="en-US"/>
           </a:p>
@@ -5245,7 +4453,7 @@
           <a:p>
             <a:fld id="{6BFECD78-3C8E-49F2-8FAB-59489D168ABB}" type="datetimeFigureOut">
               <a:rPr lang="en-US" smtClean="0"/>
-              <a:t>10/29/15</a:t>
+              <a:t>10/30/15</a:t>
             </a:fld>
             <a:endParaRPr lang="en-US"/>
           </a:p>
@@ -5543,7 +4751,7 @@
           <a:p>
             <a:fld id="{6BFECD78-3C8E-49F2-8FAB-59489D168ABB}" type="datetimeFigureOut">
               <a:rPr lang="en-US" smtClean="0"/>
-              <a:t>10/29/15</a:t>
+              <a:t>10/30/15</a:t>
             </a:fld>
             <a:endParaRPr lang="en-US"/>
           </a:p>
@@ -5940,9 +5148,223 @@
           <a:chExt cx="0" cy="0"/>
         </a:xfrm>
       </p:grpSpPr>
+      <p:sp>
+        <p:nvSpPr>
+          <p:cNvPr id="2" name="Title 1"/>
+          <p:cNvSpPr>
+            <a:spLocks noGrp="1"/>
+          </p:cNvSpPr>
+          <p:nvPr>
+            <p:ph type="title"/>
+          </p:nvPr>
+        </p:nvSpPr>
+        <p:spPr>
+          <a:xfrm>
+            <a:off x="457200" y="1365289"/>
+            <a:ext cx="8229600" cy="990600"/>
+          </a:xfrm>
+        </p:spPr>
+        <p:txBody>
+          <a:bodyPr>
+            <a:normAutofit fontScale="90000"/>
+          </a:bodyPr>
+          <a:lstStyle/>
+          <a:p>
+            <a:pPr algn="ctr"/>
+            <a:r>
+              <a:rPr lang="en-US" b="1" dirty="0"/>
+              <a:t>Investigating the Spanish to English Metamorphosis of </a:t>
+            </a:r>
+            <a:r>
+              <a:rPr lang="en-US" b="1" i="1" dirty="0" err="1" smtClean="0"/>
+              <a:t>Amad</a:t>
+            </a:r>
+            <a:r>
+              <a:rPr lang="en-US" b="1" i="1" dirty="0" err="1" smtClean="0"/>
+              <a:t>í</a:t>
+            </a:r>
+            <a:r>
+              <a:rPr lang="en-US" b="1" i="1" dirty="0" err="1" smtClean="0"/>
+              <a:t>s</a:t>
+            </a:r>
+            <a:r>
+              <a:rPr lang="en-US" b="1" i="1" dirty="0" smtClean="0"/>
+              <a:t> </a:t>
+            </a:r>
+            <a:r>
+              <a:rPr lang="en-US" b="1" i="1" dirty="0"/>
+              <a:t>de </a:t>
+            </a:r>
+            <a:r>
+              <a:rPr lang="en-US" b="1" i="1" dirty="0" err="1"/>
+              <a:t>Gaula</a:t>
+            </a:r>
+            <a:r>
+              <a:rPr lang="en-US" b="1" i="1" dirty="0"/>
+              <a:t> </a:t>
+            </a:r>
+            <a:r>
+              <a:rPr lang="en-US" b="1" dirty="0"/>
+              <a:t>with TEI</a:t>
+            </a:r>
+            <a:endParaRPr lang="en-US" dirty="0"/>
+          </a:p>
+        </p:txBody>
+      </p:sp>
+      <p:sp>
+        <p:nvSpPr>
+          <p:cNvPr id="3" name="Content Placeholder 2"/>
+          <p:cNvSpPr>
+            <a:spLocks noGrp="1"/>
+          </p:cNvSpPr>
+          <p:nvPr>
+            <p:ph idx="1"/>
+          </p:nvPr>
+        </p:nvSpPr>
+        <p:spPr>
+          <a:xfrm>
+            <a:off x="457200" y="3350590"/>
+            <a:ext cx="8229600" cy="2340824"/>
+          </a:xfrm>
+        </p:spPr>
+        <p:txBody>
+          <a:bodyPr>
+            <a:normAutofit lnSpcReduction="10000"/>
+          </a:bodyPr>
+          <a:lstStyle/>
+          <a:p>
+            <a:pPr marL="0" indent="0" algn="ctr">
+              <a:buNone/>
+            </a:pPr>
+            <a:r>
+              <a:rPr lang="en-US" dirty="0" smtClean="0"/>
+              <a:t>Stacey Triplette</a:t>
+            </a:r>
+          </a:p>
+          <a:p>
+            <a:pPr marL="0" indent="0" algn="ctr">
+              <a:buNone/>
+            </a:pPr>
+            <a:r>
+              <a:rPr lang="en-US" sz="1900" dirty="0" smtClean="0">
+                <a:solidFill>
+                  <a:schemeClr val="accent4"/>
+                </a:solidFill>
+              </a:rPr>
+              <a:t>University of Pittsburgh at Greensburg</a:t>
+            </a:r>
+          </a:p>
+          <a:p>
+            <a:pPr marL="0" indent="0" algn="ctr">
+              <a:buNone/>
+            </a:pPr>
+            <a:r>
+              <a:rPr lang="en-US" dirty="0" smtClean="0"/>
+              <a:t>Elisa Beshero-Bondar</a:t>
+            </a:r>
+          </a:p>
+          <a:p>
+            <a:pPr marL="0" indent="0" algn="ctr">
+              <a:buNone/>
+            </a:pPr>
+            <a:r>
+              <a:rPr lang="en-US" sz="1900" dirty="0" smtClean="0">
+                <a:solidFill>
+                  <a:srgbClr val="4C5A6A"/>
+                </a:solidFill>
+              </a:rPr>
+              <a:t>University of Pittsburgh at Greensburg</a:t>
+            </a:r>
+          </a:p>
+          <a:p>
+            <a:pPr marL="0" indent="0" algn="ctr">
+              <a:buNone/>
+            </a:pPr>
+            <a:r>
+              <a:rPr lang="en-US" dirty="0"/>
+              <a:t>Helena </a:t>
+            </a:r>
+            <a:r>
+              <a:rPr lang="en-US" dirty="0" err="1"/>
+              <a:t>Bermúdez</a:t>
+            </a:r>
+            <a:r>
+              <a:rPr lang="en-US" dirty="0"/>
+              <a:t> </a:t>
+            </a:r>
+            <a:r>
+              <a:rPr lang="en-US" dirty="0" err="1"/>
+              <a:t>Sabel</a:t>
+            </a:r>
+            <a:endParaRPr lang="en-US" dirty="0"/>
+          </a:p>
+          <a:p>
+            <a:pPr marL="0" indent="0" algn="ctr">
+              <a:buNone/>
+            </a:pPr>
+            <a:r>
+              <a:rPr lang="en-US" sz="1800" dirty="0" smtClean="0">
+                <a:solidFill>
+                  <a:srgbClr val="4C5A6A"/>
+                </a:solidFill>
+              </a:rPr>
+              <a:t>University of Santiago de </a:t>
+            </a:r>
+            <a:r>
+              <a:rPr lang="en-US" sz="1800" dirty="0" err="1" smtClean="0">
+                <a:solidFill>
+                  <a:srgbClr val="4C5A6A"/>
+                </a:solidFill>
+              </a:rPr>
+              <a:t>Compostela</a:t>
+            </a:r>
+            <a:endParaRPr lang="en-US" sz="1800" dirty="0" smtClean="0">
+              <a:solidFill>
+                <a:srgbClr val="4C5A6A"/>
+              </a:solidFill>
+            </a:endParaRPr>
+          </a:p>
+          <a:p>
+            <a:pPr marL="0" indent="0" algn="ctr">
+              <a:buNone/>
+            </a:pPr>
+            <a:endParaRPr lang="en-US" dirty="0" smtClean="0"/>
+          </a:p>
+        </p:txBody>
+      </p:sp>
+    </p:spTree>
+    <p:extLst>
+      <p:ext uri="{BB962C8B-B14F-4D97-AF65-F5344CB8AC3E}">
+        <p14:creationId xmlns:p14="http://schemas.microsoft.com/office/powerpoint/2010/main" val="2137902213"/>
+      </p:ext>
+    </p:extLst>
+  </p:cSld>
+  <p:clrMapOvr>
+    <a:masterClrMapping/>
+  </p:clrMapOvr>
+</p:sld>
+</file>
+
+<file path=ppt/slides/slide10.xml><?xml version="1.0" encoding="utf-8"?>
+<p:sld xmlns:a="http://schemas.openxmlformats.org/drawingml/2006/main" xmlns:r="http://schemas.openxmlformats.org/officeDocument/2006/relationships" xmlns:p="http://schemas.openxmlformats.org/presentationml/2006/main">
+  <p:cSld>
+    <p:spTree>
+      <p:nvGrpSpPr>
+        <p:cNvPr id="1" name=""/>
+        <p:cNvGrpSpPr/>
+        <p:nvPr/>
+      </p:nvGrpSpPr>
+      <p:grpSpPr>
+        <a:xfrm>
+          <a:off x="0" y="0"/>
+          <a:ext cx="0" cy="0"/>
+          <a:chOff x="0" y="0"/>
+          <a:chExt cx="0" cy="0"/>
+        </a:xfrm>
+      </p:grpSpPr>
       <p:pic>
         <p:nvPicPr>
-          <p:cNvPr id="3" name="Content Placeholder 2" descr="Screen Shot 2015-10-29 at 9.42.23 AM.png"/>
+          <p:cNvPr id="5" name="Content Placeholder 4" descr="Screen Shot 2015-10-29 at 9.30.39 AM.png"/>
           <p:cNvPicPr>
             <a:picLocks noGrp="1" noChangeAspect="1"/>
           </p:cNvPicPr>
@@ -5950,7 +5372,7 @@
             <p:ph idx="1"/>
           </p:nvPr>
         </p:nvPicPr>
-        <p:blipFill>
+        <p:blipFill rotWithShape="1">
           <a:blip r:embed="rId3">
             <a:extLst>
               <a:ext uri="{28A0092B-C50C-407E-A947-70E740481C1C}">
@@ -5958,22 +5380,20 @@
               </a:ext>
             </a:extLst>
           </a:blip>
-          <a:srcRect t="-8711" b="-8711"/>
-          <a:stretch>
-            <a:fillRect/>
-          </a:stretch>
+          <a:srcRect l="2479" t="265" r="2991" b="265"/>
+          <a:stretch/>
         </p:blipFill>
         <p:spPr>
           <a:xfrm>
-            <a:off x="457200" y="988219"/>
-            <a:ext cx="8229600" cy="4876800"/>
+            <a:off x="229508" y="699909"/>
+            <a:ext cx="8751923" cy="5486400"/>
           </a:xfrm>
         </p:spPr>
       </p:pic>
     </p:spTree>
     <p:extLst>
       <p:ext uri="{BB962C8B-B14F-4D97-AF65-F5344CB8AC3E}">
-        <p14:creationId xmlns:p14="http://schemas.microsoft.com/office/powerpoint/2010/main" val="1190386664"/>
+        <p14:creationId xmlns:p14="http://schemas.microsoft.com/office/powerpoint/2010/main" val="1971268345"/>
       </p:ext>
     </p:extLst>
   </p:cSld>
@@ -5990,7 +5410,74 @@
 </p:sld>
 </file>
 
-<file path=ppt/slides/slide10.xml><?xml version="1.0" encoding="utf-8"?>
+<file path=ppt/slides/slide11.xml><?xml version="1.0" encoding="utf-8"?>
+<p:sld xmlns:a="http://schemas.openxmlformats.org/drawingml/2006/main" xmlns:r="http://schemas.openxmlformats.org/officeDocument/2006/relationships" xmlns:p="http://schemas.openxmlformats.org/presentationml/2006/main">
+  <p:cSld>
+    <p:spTree>
+      <p:nvGrpSpPr>
+        <p:cNvPr id="1" name=""/>
+        <p:cNvGrpSpPr/>
+        <p:nvPr/>
+      </p:nvGrpSpPr>
+      <p:grpSpPr>
+        <a:xfrm>
+          <a:off x="0" y="0"/>
+          <a:ext cx="0" cy="0"/>
+          <a:chOff x="0" y="0"/>
+          <a:chExt cx="0" cy="0"/>
+        </a:xfrm>
+      </p:grpSpPr>
+      <p:pic>
+        <p:nvPicPr>
+          <p:cNvPr id="3" name="Content Placeholder 2" descr="Screen Shot 2015-10-30 at 2.02.25 PM.png"/>
+          <p:cNvPicPr>
+            <a:picLocks noGrp="1" noChangeAspect="1"/>
+          </p:cNvPicPr>
+          <p:nvPr>
+            <p:ph idx="1"/>
+          </p:nvPr>
+        </p:nvPicPr>
+        <p:blipFill>
+          <a:blip r:embed="rId3">
+            <a:extLst>
+              <a:ext uri="{28A0092B-C50C-407E-A947-70E740481C1C}">
+                <a14:useLocalDpi xmlns:a14="http://schemas.microsoft.com/office/drawing/2010/main" val="0"/>
+              </a:ext>
+            </a:extLst>
+          </a:blip>
+          <a:srcRect t="-9585" b="-9585"/>
+          <a:stretch>
+            <a:fillRect/>
+          </a:stretch>
+        </p:blipFill>
+        <p:spPr>
+          <a:xfrm>
+            <a:off x="457200" y="1125916"/>
+            <a:ext cx="8229600" cy="4876800"/>
+          </a:xfrm>
+        </p:spPr>
+      </p:pic>
+    </p:spTree>
+    <p:extLst>
+      <p:ext uri="{BB962C8B-B14F-4D97-AF65-F5344CB8AC3E}">
+        <p14:creationId xmlns:p14="http://schemas.microsoft.com/office/powerpoint/2010/main" val="998473299"/>
+      </p:ext>
+    </p:extLst>
+  </p:cSld>
+  <p:clrMapOvr>
+    <a:masterClrMapping/>
+  </p:clrMapOvr>
+  <p:timing>
+    <p:tnLst>
+      <p:par>
+        <p:cTn xmlns:p14="http://schemas.microsoft.com/office/powerpoint/2010/main" id="1" dur="indefinite" restart="never" nodeType="tmRoot"/>
+      </p:par>
+    </p:tnLst>
+  </p:timing>
+</p:sld>
+</file>
+
+<file path=ppt/slides/slide12.xml><?xml version="1.0" encoding="utf-8"?>
 <p:sld xmlns:a="http://schemas.openxmlformats.org/drawingml/2006/main" xmlns:r="http://schemas.openxmlformats.org/officeDocument/2006/relationships" xmlns:p="http://schemas.openxmlformats.org/presentationml/2006/main">
   <p:cSld>
     <p:spTree>
@@ -6057,7 +5544,7 @@
 </p:sld>
 </file>
 
-<file path=ppt/slides/slide11.xml><?xml version="1.0" encoding="utf-8"?>
+<file path=ppt/slides/slide13.xml><?xml version="1.0" encoding="utf-8"?>
 <p:sld xmlns:a="http://schemas.openxmlformats.org/drawingml/2006/main" xmlns:r="http://schemas.openxmlformats.org/officeDocument/2006/relationships" xmlns:p="http://schemas.openxmlformats.org/presentationml/2006/main">
   <p:cSld>
     <p:spTree>
@@ -6124,7 +5611,7 @@
 </p:sld>
 </file>
 
-<file path=ppt/slides/slide12.xml><?xml version="1.0" encoding="utf-8"?>
+<file path=ppt/slides/slide14.xml><?xml version="1.0" encoding="utf-8"?>
 <p:sld xmlns:a="http://schemas.openxmlformats.org/drawingml/2006/main" xmlns:r="http://schemas.openxmlformats.org/officeDocument/2006/relationships" xmlns:p="http://schemas.openxmlformats.org/presentationml/2006/main">
   <p:cSld>
     <p:spTree>
@@ -6221,7 +5708,7 @@
 </p:sld>
 </file>
 
-<file path=ppt/slides/slide13.xml><?xml version="1.0" encoding="utf-8"?>
+<file path=ppt/slides/slide2.xml><?xml version="1.0" encoding="utf-8"?>
 <p:sld xmlns:a="http://schemas.openxmlformats.org/drawingml/2006/main" xmlns:r="http://schemas.openxmlformats.org/officeDocument/2006/relationships" xmlns:p="http://schemas.openxmlformats.org/presentationml/2006/main">
   <p:cSld>
     <p:spTree>
@@ -6238,29 +5725,40 @@
           <a:chExt cx="0" cy="0"/>
         </a:xfrm>
       </p:grpSpPr>
-      <p:sp>
-        <p:nvSpPr>
-          <p:cNvPr id="2" name="Content Placeholder 1"/>
-          <p:cNvSpPr>
-            <a:spLocks noGrp="1"/>
-          </p:cNvSpPr>
+      <p:pic>
+        <p:nvPicPr>
+          <p:cNvPr id="3" name="Content Placeholder 2" descr="Screen Shot 2015-10-29 at 9.42.23 AM.png"/>
+          <p:cNvPicPr>
+            <a:picLocks noGrp="1" noChangeAspect="1"/>
+          </p:cNvPicPr>
           <p:nvPr>
             <p:ph idx="1"/>
           </p:nvPr>
-        </p:nvSpPr>
-        <p:spPr/>
-        <p:txBody>
-          <a:bodyPr/>
-          <a:lstStyle/>
-          <a:p>
-            <a:endParaRPr lang="en-US"/>
-          </a:p>
-        </p:txBody>
-      </p:sp>
+        </p:nvPicPr>
+        <p:blipFill>
+          <a:blip r:embed="rId3">
+            <a:extLst>
+              <a:ext uri="{28A0092B-C50C-407E-A947-70E740481C1C}">
+                <a14:useLocalDpi xmlns:a14="http://schemas.microsoft.com/office/drawing/2010/main" val="0"/>
+              </a:ext>
+            </a:extLst>
+          </a:blip>
+          <a:srcRect t="-8711" b="-8711"/>
+          <a:stretch>
+            <a:fillRect/>
+          </a:stretch>
+        </p:blipFill>
+        <p:spPr>
+          <a:xfrm>
+            <a:off x="457200" y="988219"/>
+            <a:ext cx="8229600" cy="4876800"/>
+          </a:xfrm>
+        </p:spPr>
+      </p:pic>
     </p:spTree>
     <p:extLst>
       <p:ext uri="{BB962C8B-B14F-4D97-AF65-F5344CB8AC3E}">
-        <p14:creationId xmlns:p14="http://schemas.microsoft.com/office/powerpoint/2010/main" val="1922685436"/>
+        <p14:creationId xmlns:p14="http://schemas.microsoft.com/office/powerpoint/2010/main" val="1190386664"/>
       </p:ext>
     </p:extLst>
   </p:cSld>
@@ -6277,343 +5775,7 @@
 </p:sld>
 </file>
 
-<file path=ppt/slides/slide14.xml><?xml version="1.0" encoding="utf-8"?>
-<p:sld xmlns:a="http://schemas.openxmlformats.org/drawingml/2006/main" xmlns:r="http://schemas.openxmlformats.org/officeDocument/2006/relationships" xmlns:p="http://schemas.openxmlformats.org/presentationml/2006/main">
-  <p:cSld>
-    <p:spTree>
-      <p:nvGrpSpPr>
-        <p:cNvPr id="1" name=""/>
-        <p:cNvGrpSpPr/>
-        <p:nvPr/>
-      </p:nvGrpSpPr>
-      <p:grpSpPr>
-        <a:xfrm>
-          <a:off x="0" y="0"/>
-          <a:ext cx="0" cy="0"/>
-          <a:chOff x="0" y="0"/>
-          <a:chExt cx="0" cy="0"/>
-        </a:xfrm>
-      </p:grpSpPr>
-      <p:sp>
-        <p:nvSpPr>
-          <p:cNvPr id="2" name="Content Placeholder 1"/>
-          <p:cNvSpPr>
-            <a:spLocks noGrp="1"/>
-          </p:cNvSpPr>
-          <p:nvPr>
-            <p:ph idx="1"/>
-          </p:nvPr>
-        </p:nvSpPr>
-        <p:spPr/>
-        <p:txBody>
-          <a:bodyPr/>
-          <a:lstStyle/>
-          <a:p>
-            <a:endParaRPr lang="en-US"/>
-          </a:p>
-        </p:txBody>
-      </p:sp>
-    </p:spTree>
-    <p:extLst>
-      <p:ext uri="{BB962C8B-B14F-4D97-AF65-F5344CB8AC3E}">
-        <p14:creationId xmlns:p14="http://schemas.microsoft.com/office/powerpoint/2010/main" val="2924316289"/>
-      </p:ext>
-    </p:extLst>
-  </p:cSld>
-  <p:clrMapOvr>
-    <a:masterClrMapping/>
-  </p:clrMapOvr>
-  <p:timing>
-    <p:tnLst>
-      <p:par>
-        <p:cTn xmlns:p14="http://schemas.microsoft.com/office/powerpoint/2010/main" id="1" dur="indefinite" restart="never" nodeType="tmRoot"/>
-      </p:par>
-    </p:tnLst>
-  </p:timing>
-</p:sld>
-</file>
-
-<file path=ppt/slides/slide15.xml><?xml version="1.0" encoding="utf-8"?>
-<p:sld xmlns:a="http://schemas.openxmlformats.org/drawingml/2006/main" xmlns:r="http://schemas.openxmlformats.org/officeDocument/2006/relationships" xmlns:p="http://schemas.openxmlformats.org/presentationml/2006/main">
-  <p:cSld>
-    <p:spTree>
-      <p:nvGrpSpPr>
-        <p:cNvPr id="1" name=""/>
-        <p:cNvGrpSpPr/>
-        <p:nvPr/>
-      </p:nvGrpSpPr>
-      <p:grpSpPr>
-        <a:xfrm>
-          <a:off x="0" y="0"/>
-          <a:ext cx="0" cy="0"/>
-          <a:chOff x="0" y="0"/>
-          <a:chExt cx="0" cy="0"/>
-        </a:xfrm>
-      </p:grpSpPr>
-      <p:sp>
-        <p:nvSpPr>
-          <p:cNvPr id="2" name="Content Placeholder 1"/>
-          <p:cNvSpPr>
-            <a:spLocks noGrp="1"/>
-          </p:cNvSpPr>
-          <p:nvPr>
-            <p:ph idx="1"/>
-          </p:nvPr>
-        </p:nvSpPr>
-        <p:spPr/>
-        <p:txBody>
-          <a:bodyPr/>
-          <a:lstStyle/>
-          <a:p>
-            <a:endParaRPr lang="en-US"/>
-          </a:p>
-        </p:txBody>
-      </p:sp>
-    </p:spTree>
-    <p:extLst>
-      <p:ext uri="{BB962C8B-B14F-4D97-AF65-F5344CB8AC3E}">
-        <p14:creationId xmlns:p14="http://schemas.microsoft.com/office/powerpoint/2010/main" val="3715803385"/>
-      </p:ext>
-    </p:extLst>
-  </p:cSld>
-  <p:clrMapOvr>
-    <a:masterClrMapping/>
-  </p:clrMapOvr>
-  <p:timing>
-    <p:tnLst>
-      <p:par>
-        <p:cTn xmlns:p14="http://schemas.microsoft.com/office/powerpoint/2010/main" id="1" dur="indefinite" restart="never" nodeType="tmRoot"/>
-      </p:par>
-    </p:tnLst>
-  </p:timing>
-</p:sld>
-</file>
-
-<file path=ppt/slides/slide16.xml><?xml version="1.0" encoding="utf-8"?>
-<p:sld xmlns:a="http://schemas.openxmlformats.org/drawingml/2006/main" xmlns:r="http://schemas.openxmlformats.org/officeDocument/2006/relationships" xmlns:p="http://schemas.openxmlformats.org/presentationml/2006/main">
-  <p:cSld>
-    <p:spTree>
-      <p:nvGrpSpPr>
-        <p:cNvPr id="1" name=""/>
-        <p:cNvGrpSpPr/>
-        <p:nvPr/>
-      </p:nvGrpSpPr>
-      <p:grpSpPr>
-        <a:xfrm>
-          <a:off x="0" y="0"/>
-          <a:ext cx="0" cy="0"/>
-          <a:chOff x="0" y="0"/>
-          <a:chExt cx="0" cy="0"/>
-        </a:xfrm>
-      </p:grpSpPr>
-      <p:sp>
-        <p:nvSpPr>
-          <p:cNvPr id="2" name="Content Placeholder 1"/>
-          <p:cNvSpPr>
-            <a:spLocks noGrp="1"/>
-          </p:cNvSpPr>
-          <p:nvPr>
-            <p:ph idx="1"/>
-          </p:nvPr>
-        </p:nvSpPr>
-        <p:spPr/>
-        <p:txBody>
-          <a:bodyPr/>
-          <a:lstStyle/>
-          <a:p>
-            <a:endParaRPr lang="en-US"/>
-          </a:p>
-        </p:txBody>
-      </p:sp>
-    </p:spTree>
-    <p:extLst>
-      <p:ext uri="{BB962C8B-B14F-4D97-AF65-F5344CB8AC3E}">
-        <p14:creationId xmlns:p14="http://schemas.microsoft.com/office/powerpoint/2010/main" val="4209819808"/>
-      </p:ext>
-    </p:extLst>
-  </p:cSld>
-  <p:clrMapOvr>
-    <a:masterClrMapping/>
-  </p:clrMapOvr>
-  <p:timing>
-    <p:tnLst>
-      <p:par>
-        <p:cTn xmlns:p14="http://schemas.microsoft.com/office/powerpoint/2010/main" id="1" dur="indefinite" restart="never" nodeType="tmRoot"/>
-      </p:par>
-    </p:tnLst>
-  </p:timing>
-</p:sld>
-</file>
-
-<file path=ppt/slides/slide17.xml><?xml version="1.0" encoding="utf-8"?>
-<p:sld xmlns:a="http://schemas.openxmlformats.org/drawingml/2006/main" xmlns:r="http://schemas.openxmlformats.org/officeDocument/2006/relationships" xmlns:p="http://schemas.openxmlformats.org/presentationml/2006/main">
-  <p:cSld>
-    <p:spTree>
-      <p:nvGrpSpPr>
-        <p:cNvPr id="1" name=""/>
-        <p:cNvGrpSpPr/>
-        <p:nvPr/>
-      </p:nvGrpSpPr>
-      <p:grpSpPr>
-        <a:xfrm>
-          <a:off x="0" y="0"/>
-          <a:ext cx="0" cy="0"/>
-          <a:chOff x="0" y="0"/>
-          <a:chExt cx="0" cy="0"/>
-        </a:xfrm>
-      </p:grpSpPr>
-      <p:sp>
-        <p:nvSpPr>
-          <p:cNvPr id="2" name="Content Placeholder 1"/>
-          <p:cNvSpPr>
-            <a:spLocks noGrp="1"/>
-          </p:cNvSpPr>
-          <p:nvPr>
-            <p:ph idx="1"/>
-          </p:nvPr>
-        </p:nvSpPr>
-        <p:spPr/>
-        <p:txBody>
-          <a:bodyPr/>
-          <a:lstStyle/>
-          <a:p>
-            <a:endParaRPr lang="en-US"/>
-          </a:p>
-        </p:txBody>
-      </p:sp>
-    </p:spTree>
-    <p:extLst>
-      <p:ext uri="{BB962C8B-B14F-4D97-AF65-F5344CB8AC3E}">
-        <p14:creationId xmlns:p14="http://schemas.microsoft.com/office/powerpoint/2010/main" val="1012588284"/>
-      </p:ext>
-    </p:extLst>
-  </p:cSld>
-  <p:clrMapOvr>
-    <a:masterClrMapping/>
-  </p:clrMapOvr>
-  <p:timing>
-    <p:tnLst>
-      <p:par>
-        <p:cTn xmlns:p14="http://schemas.microsoft.com/office/powerpoint/2010/main" id="1" dur="indefinite" restart="never" nodeType="tmRoot"/>
-      </p:par>
-    </p:tnLst>
-  </p:timing>
-</p:sld>
-</file>
-
-<file path=ppt/slides/slide18.xml><?xml version="1.0" encoding="utf-8"?>
-<p:sld xmlns:a="http://schemas.openxmlformats.org/drawingml/2006/main" xmlns:r="http://schemas.openxmlformats.org/officeDocument/2006/relationships" xmlns:p="http://schemas.openxmlformats.org/presentationml/2006/main">
-  <p:cSld>
-    <p:spTree>
-      <p:nvGrpSpPr>
-        <p:cNvPr id="1" name=""/>
-        <p:cNvGrpSpPr/>
-        <p:nvPr/>
-      </p:nvGrpSpPr>
-      <p:grpSpPr>
-        <a:xfrm>
-          <a:off x="0" y="0"/>
-          <a:ext cx="0" cy="0"/>
-          <a:chOff x="0" y="0"/>
-          <a:chExt cx="0" cy="0"/>
-        </a:xfrm>
-      </p:grpSpPr>
-      <p:sp>
-        <p:nvSpPr>
-          <p:cNvPr id="2" name="Content Placeholder 1"/>
-          <p:cNvSpPr>
-            <a:spLocks noGrp="1"/>
-          </p:cNvSpPr>
-          <p:nvPr>
-            <p:ph idx="1"/>
-          </p:nvPr>
-        </p:nvSpPr>
-        <p:spPr/>
-        <p:txBody>
-          <a:bodyPr/>
-          <a:lstStyle/>
-          <a:p>
-            <a:endParaRPr lang="en-US"/>
-          </a:p>
-        </p:txBody>
-      </p:sp>
-    </p:spTree>
-    <p:extLst>
-      <p:ext uri="{BB962C8B-B14F-4D97-AF65-F5344CB8AC3E}">
-        <p14:creationId xmlns:p14="http://schemas.microsoft.com/office/powerpoint/2010/main" val="3318642005"/>
-      </p:ext>
-    </p:extLst>
-  </p:cSld>
-  <p:clrMapOvr>
-    <a:masterClrMapping/>
-  </p:clrMapOvr>
-  <p:timing>
-    <p:tnLst>
-      <p:par>
-        <p:cTn xmlns:p14="http://schemas.microsoft.com/office/powerpoint/2010/main" id="1" dur="indefinite" restart="never" nodeType="tmRoot"/>
-      </p:par>
-    </p:tnLst>
-  </p:timing>
-</p:sld>
-</file>
-
-<file path=ppt/slides/slide19.xml><?xml version="1.0" encoding="utf-8"?>
-<p:sld xmlns:a="http://schemas.openxmlformats.org/drawingml/2006/main" xmlns:r="http://schemas.openxmlformats.org/officeDocument/2006/relationships" xmlns:p="http://schemas.openxmlformats.org/presentationml/2006/main">
-  <p:cSld>
-    <p:spTree>
-      <p:nvGrpSpPr>
-        <p:cNvPr id="1" name=""/>
-        <p:cNvGrpSpPr/>
-        <p:nvPr/>
-      </p:nvGrpSpPr>
-      <p:grpSpPr>
-        <a:xfrm>
-          <a:off x="0" y="0"/>
-          <a:ext cx="0" cy="0"/>
-          <a:chOff x="0" y="0"/>
-          <a:chExt cx="0" cy="0"/>
-        </a:xfrm>
-      </p:grpSpPr>
-      <p:sp>
-        <p:nvSpPr>
-          <p:cNvPr id="2" name="Content Placeholder 1"/>
-          <p:cNvSpPr>
-            <a:spLocks noGrp="1"/>
-          </p:cNvSpPr>
-          <p:nvPr>
-            <p:ph idx="1"/>
-          </p:nvPr>
-        </p:nvSpPr>
-        <p:spPr/>
-        <p:txBody>
-          <a:bodyPr/>
-          <a:lstStyle/>
-          <a:p>
-            <a:endParaRPr lang="en-US"/>
-          </a:p>
-        </p:txBody>
-      </p:sp>
-    </p:spTree>
-    <p:extLst>
-      <p:ext uri="{BB962C8B-B14F-4D97-AF65-F5344CB8AC3E}">
-        <p14:creationId xmlns:p14="http://schemas.microsoft.com/office/powerpoint/2010/main" val="685011244"/>
-      </p:ext>
-    </p:extLst>
-  </p:cSld>
-  <p:clrMapOvr>
-    <a:masterClrMapping/>
-  </p:clrMapOvr>
-  <p:timing>
-    <p:tnLst>
-      <p:par>
-        <p:cTn xmlns:p14="http://schemas.microsoft.com/office/powerpoint/2010/main" id="1" dur="indefinite" restart="never" nodeType="tmRoot"/>
-      </p:par>
-    </p:tnLst>
-  </p:timing>
-</p:sld>
-</file>
-
-<file path=ppt/slides/slide2.xml><?xml version="1.0" encoding="utf-8"?>
+<file path=ppt/slides/slide3.xml><?xml version="1.0" encoding="utf-8"?>
 <p:sld xmlns:a="http://schemas.openxmlformats.org/drawingml/2006/main" xmlns:r="http://schemas.openxmlformats.org/officeDocument/2006/relationships" xmlns:p="http://schemas.openxmlformats.org/presentationml/2006/main">
   <p:cSld>
     <p:spTree>
@@ -6680,287 +5842,7 @@
 </p:sld>
 </file>
 
-<file path=ppt/slides/slide20.xml><?xml version="1.0" encoding="utf-8"?>
-<p:sld xmlns:a="http://schemas.openxmlformats.org/drawingml/2006/main" xmlns:r="http://schemas.openxmlformats.org/officeDocument/2006/relationships" xmlns:p="http://schemas.openxmlformats.org/presentationml/2006/main">
-  <p:cSld>
-    <p:spTree>
-      <p:nvGrpSpPr>
-        <p:cNvPr id="1" name=""/>
-        <p:cNvGrpSpPr/>
-        <p:nvPr/>
-      </p:nvGrpSpPr>
-      <p:grpSpPr>
-        <a:xfrm>
-          <a:off x="0" y="0"/>
-          <a:ext cx="0" cy="0"/>
-          <a:chOff x="0" y="0"/>
-          <a:chExt cx="0" cy="0"/>
-        </a:xfrm>
-      </p:grpSpPr>
-      <p:sp>
-        <p:nvSpPr>
-          <p:cNvPr id="2" name="Content Placeholder 1"/>
-          <p:cNvSpPr>
-            <a:spLocks noGrp="1"/>
-          </p:cNvSpPr>
-          <p:nvPr>
-            <p:ph idx="1"/>
-          </p:nvPr>
-        </p:nvSpPr>
-        <p:spPr/>
-        <p:txBody>
-          <a:bodyPr/>
-          <a:lstStyle/>
-          <a:p>
-            <a:endParaRPr lang="en-US"/>
-          </a:p>
-        </p:txBody>
-      </p:sp>
-    </p:spTree>
-    <p:extLst>
-      <p:ext uri="{BB962C8B-B14F-4D97-AF65-F5344CB8AC3E}">
-        <p14:creationId xmlns:p14="http://schemas.microsoft.com/office/powerpoint/2010/main" val="538749692"/>
-      </p:ext>
-    </p:extLst>
-  </p:cSld>
-  <p:clrMapOvr>
-    <a:masterClrMapping/>
-  </p:clrMapOvr>
-  <p:timing>
-    <p:tnLst>
-      <p:par>
-        <p:cTn xmlns:p14="http://schemas.microsoft.com/office/powerpoint/2010/main" id="1" dur="indefinite" restart="never" nodeType="tmRoot"/>
-      </p:par>
-    </p:tnLst>
-  </p:timing>
-</p:sld>
-</file>
-
-<file path=ppt/slides/slide21.xml><?xml version="1.0" encoding="utf-8"?>
-<p:sld xmlns:a="http://schemas.openxmlformats.org/drawingml/2006/main" xmlns:r="http://schemas.openxmlformats.org/officeDocument/2006/relationships" xmlns:p="http://schemas.openxmlformats.org/presentationml/2006/main">
-  <p:cSld>
-    <p:spTree>
-      <p:nvGrpSpPr>
-        <p:cNvPr id="1" name=""/>
-        <p:cNvGrpSpPr/>
-        <p:nvPr/>
-      </p:nvGrpSpPr>
-      <p:grpSpPr>
-        <a:xfrm>
-          <a:off x="0" y="0"/>
-          <a:ext cx="0" cy="0"/>
-          <a:chOff x="0" y="0"/>
-          <a:chExt cx="0" cy="0"/>
-        </a:xfrm>
-      </p:grpSpPr>
-      <p:sp>
-        <p:nvSpPr>
-          <p:cNvPr id="2" name="Content Placeholder 1"/>
-          <p:cNvSpPr>
-            <a:spLocks noGrp="1"/>
-          </p:cNvSpPr>
-          <p:nvPr>
-            <p:ph idx="1"/>
-          </p:nvPr>
-        </p:nvSpPr>
-        <p:spPr/>
-        <p:txBody>
-          <a:bodyPr/>
-          <a:lstStyle/>
-          <a:p>
-            <a:endParaRPr lang="en-US"/>
-          </a:p>
-        </p:txBody>
-      </p:sp>
-    </p:spTree>
-    <p:extLst>
-      <p:ext uri="{BB962C8B-B14F-4D97-AF65-F5344CB8AC3E}">
-        <p14:creationId xmlns:p14="http://schemas.microsoft.com/office/powerpoint/2010/main" val="1850162900"/>
-      </p:ext>
-    </p:extLst>
-  </p:cSld>
-  <p:clrMapOvr>
-    <a:masterClrMapping/>
-  </p:clrMapOvr>
-  <p:timing>
-    <p:tnLst>
-      <p:par>
-        <p:cTn xmlns:p14="http://schemas.microsoft.com/office/powerpoint/2010/main" id="1" dur="indefinite" restart="never" nodeType="tmRoot"/>
-      </p:par>
-    </p:tnLst>
-  </p:timing>
-</p:sld>
-</file>
-
-<file path=ppt/slides/slide22.xml><?xml version="1.0" encoding="utf-8"?>
-<p:sld xmlns:a="http://schemas.openxmlformats.org/drawingml/2006/main" xmlns:r="http://schemas.openxmlformats.org/officeDocument/2006/relationships" xmlns:p="http://schemas.openxmlformats.org/presentationml/2006/main">
-  <p:cSld>
-    <p:spTree>
-      <p:nvGrpSpPr>
-        <p:cNvPr id="1" name=""/>
-        <p:cNvGrpSpPr/>
-        <p:nvPr/>
-      </p:nvGrpSpPr>
-      <p:grpSpPr>
-        <a:xfrm>
-          <a:off x="0" y="0"/>
-          <a:ext cx="0" cy="0"/>
-          <a:chOff x="0" y="0"/>
-          <a:chExt cx="0" cy="0"/>
-        </a:xfrm>
-      </p:grpSpPr>
-      <p:sp>
-        <p:nvSpPr>
-          <p:cNvPr id="2" name="Content Placeholder 1"/>
-          <p:cNvSpPr>
-            <a:spLocks noGrp="1"/>
-          </p:cNvSpPr>
-          <p:nvPr>
-            <p:ph idx="1"/>
-          </p:nvPr>
-        </p:nvSpPr>
-        <p:spPr/>
-        <p:txBody>
-          <a:bodyPr/>
-          <a:lstStyle/>
-          <a:p>
-            <a:endParaRPr lang="en-US"/>
-          </a:p>
-        </p:txBody>
-      </p:sp>
-    </p:spTree>
-    <p:extLst>
-      <p:ext uri="{BB962C8B-B14F-4D97-AF65-F5344CB8AC3E}">
-        <p14:creationId xmlns:p14="http://schemas.microsoft.com/office/powerpoint/2010/main" val="1369690358"/>
-      </p:ext>
-    </p:extLst>
-  </p:cSld>
-  <p:clrMapOvr>
-    <a:masterClrMapping/>
-  </p:clrMapOvr>
-  <p:timing>
-    <p:tnLst>
-      <p:par>
-        <p:cTn xmlns:p14="http://schemas.microsoft.com/office/powerpoint/2010/main" id="1" dur="indefinite" restart="never" nodeType="tmRoot"/>
-      </p:par>
-    </p:tnLst>
-  </p:timing>
-</p:sld>
-</file>
-
-<file path=ppt/slides/slide23.xml><?xml version="1.0" encoding="utf-8"?>
-<p:sld xmlns:a="http://schemas.openxmlformats.org/drawingml/2006/main" xmlns:r="http://schemas.openxmlformats.org/officeDocument/2006/relationships" xmlns:p="http://schemas.openxmlformats.org/presentationml/2006/main">
-  <p:cSld>
-    <p:spTree>
-      <p:nvGrpSpPr>
-        <p:cNvPr id="1" name=""/>
-        <p:cNvGrpSpPr/>
-        <p:nvPr/>
-      </p:nvGrpSpPr>
-      <p:grpSpPr>
-        <a:xfrm>
-          <a:off x="0" y="0"/>
-          <a:ext cx="0" cy="0"/>
-          <a:chOff x="0" y="0"/>
-          <a:chExt cx="0" cy="0"/>
-        </a:xfrm>
-      </p:grpSpPr>
-      <p:sp>
-        <p:nvSpPr>
-          <p:cNvPr id="2" name="Content Placeholder 1"/>
-          <p:cNvSpPr>
-            <a:spLocks noGrp="1"/>
-          </p:cNvSpPr>
-          <p:nvPr>
-            <p:ph idx="1"/>
-          </p:nvPr>
-        </p:nvSpPr>
-        <p:spPr/>
-        <p:txBody>
-          <a:bodyPr/>
-          <a:lstStyle/>
-          <a:p>
-            <a:endParaRPr lang="en-US"/>
-          </a:p>
-        </p:txBody>
-      </p:sp>
-    </p:spTree>
-    <p:extLst>
-      <p:ext uri="{BB962C8B-B14F-4D97-AF65-F5344CB8AC3E}">
-        <p14:creationId xmlns:p14="http://schemas.microsoft.com/office/powerpoint/2010/main" val="2573736155"/>
-      </p:ext>
-    </p:extLst>
-  </p:cSld>
-  <p:clrMapOvr>
-    <a:masterClrMapping/>
-  </p:clrMapOvr>
-  <p:timing>
-    <p:tnLst>
-      <p:par>
-        <p:cTn xmlns:p14="http://schemas.microsoft.com/office/powerpoint/2010/main" id="1" dur="indefinite" restart="never" nodeType="tmRoot"/>
-      </p:par>
-    </p:tnLst>
-  </p:timing>
-</p:sld>
-</file>
-
-<file path=ppt/slides/slide24.xml><?xml version="1.0" encoding="utf-8"?>
-<p:sld xmlns:a="http://schemas.openxmlformats.org/drawingml/2006/main" xmlns:r="http://schemas.openxmlformats.org/officeDocument/2006/relationships" xmlns:p="http://schemas.openxmlformats.org/presentationml/2006/main">
-  <p:cSld>
-    <p:spTree>
-      <p:nvGrpSpPr>
-        <p:cNvPr id="1" name=""/>
-        <p:cNvGrpSpPr/>
-        <p:nvPr/>
-      </p:nvGrpSpPr>
-      <p:grpSpPr>
-        <a:xfrm>
-          <a:off x="0" y="0"/>
-          <a:ext cx="0" cy="0"/>
-          <a:chOff x="0" y="0"/>
-          <a:chExt cx="0" cy="0"/>
-        </a:xfrm>
-      </p:grpSpPr>
-      <p:sp>
-        <p:nvSpPr>
-          <p:cNvPr id="2" name="Content Placeholder 1"/>
-          <p:cNvSpPr>
-            <a:spLocks noGrp="1"/>
-          </p:cNvSpPr>
-          <p:nvPr>
-            <p:ph idx="1"/>
-          </p:nvPr>
-        </p:nvSpPr>
-        <p:spPr/>
-        <p:txBody>
-          <a:bodyPr/>
-          <a:lstStyle/>
-          <a:p>
-            <a:endParaRPr lang="en-US"/>
-          </a:p>
-        </p:txBody>
-      </p:sp>
-    </p:spTree>
-    <p:extLst>
-      <p:ext uri="{BB962C8B-B14F-4D97-AF65-F5344CB8AC3E}">
-        <p14:creationId xmlns:p14="http://schemas.microsoft.com/office/powerpoint/2010/main" val="28476241"/>
-      </p:ext>
-    </p:extLst>
-  </p:cSld>
-  <p:clrMapOvr>
-    <a:masterClrMapping/>
-  </p:clrMapOvr>
-  <p:timing>
-    <p:tnLst>
-      <p:par>
-        <p:cTn xmlns:p14="http://schemas.microsoft.com/office/powerpoint/2010/main" id="1" dur="indefinite" restart="never" nodeType="tmRoot"/>
-      </p:par>
-    </p:tnLst>
-  </p:timing>
-</p:sld>
-</file>
-
-<file path=ppt/slides/slide3.xml><?xml version="1.0" encoding="utf-8"?>
+<file path=ppt/slides/slide4.xml><?xml version="1.0" encoding="utf-8"?>
 <p:sld xmlns:a="http://schemas.openxmlformats.org/drawingml/2006/main" xmlns:r="http://schemas.openxmlformats.org/officeDocument/2006/relationships" xmlns:p="http://schemas.openxmlformats.org/presentationml/2006/main">
   <p:cSld>
     <p:spTree>
@@ -7027,7 +5909,7 @@
 </p:sld>
 </file>
 
-<file path=ppt/slides/slide4.xml><?xml version="1.0" encoding="utf-8"?>
+<file path=ppt/slides/slide5.xml><?xml version="1.0" encoding="utf-8"?>
 <p:sld xmlns:a="http://schemas.openxmlformats.org/drawingml/2006/main" xmlns:r="http://schemas.openxmlformats.org/officeDocument/2006/relationships" xmlns:p="http://schemas.openxmlformats.org/presentationml/2006/main">
   <p:cSld>
     <p:spTree>
@@ -7052,7 +5934,7 @@
           </p:cNvPicPr>
           <p:nvPr/>
         </p:nvPicPr>
-        <p:blipFill>
+        <p:blipFill rotWithShape="1">
           <a:blip r:embed="rId3">
             <a:extLst>
               <a:ext uri="{28A0092B-C50C-407E-A947-70E740481C1C}">
@@ -7060,18 +5942,18 @@
               </a:ext>
             </a:extLst>
           </a:blip>
-          <a:stretch>
-            <a:fillRect/>
-          </a:stretch>
+          <a:srcRect l="6846" t="6596" r="8336"/>
+          <a:stretch/>
         </p:blipFill>
         <p:spPr>
           <a:xfrm>
-            <a:off x="4637035" y="3287377"/>
-            <a:ext cx="2565400" cy="952500"/>
+            <a:off x="4453428" y="2935487"/>
+            <a:ext cx="3779239" cy="1545248"/>
           </a:xfrm>
           <a:prstGeom prst="rect">
             <a:avLst/>
           </a:prstGeom>
+          <a:noFill/>
         </p:spPr>
       </p:pic>
       <p:pic>
@@ -7097,12 +5979,16 @@
         </p:blipFill>
         <p:spPr>
           <a:xfrm>
-            <a:off x="462634" y="3287377"/>
-            <a:ext cx="2765464" cy="1520898"/>
+            <a:off x="202523" y="2935487"/>
+            <a:ext cx="3703621" cy="2036848"/>
           </a:xfrm>
           <a:prstGeom prst="rect">
             <a:avLst/>
           </a:prstGeom>
+          <a:noFill/>
+          <a:ln w="6350" cmpd="sng">
+            <a:noFill/>
+          </a:ln>
         </p:spPr>
       </p:pic>
       <p:sp>
@@ -7161,7 +6047,7 @@
         </p:nvSpPr>
         <p:spPr>
           <a:xfrm>
-            <a:off x="4590169" y="957709"/>
+            <a:off x="4346324" y="957709"/>
             <a:ext cx="3672136" cy="1569660"/>
           </a:xfrm>
           <a:prstGeom prst="rect">
@@ -7191,108 +6077,91 @@
           </a:p>
         </p:txBody>
       </p:sp>
-    </p:spTree>
-    <p:extLst>
-      <p:ext uri="{BB962C8B-B14F-4D97-AF65-F5344CB8AC3E}">
-        <p14:creationId xmlns:p14="http://schemas.microsoft.com/office/powerpoint/2010/main" val="3944512546"/>
-      </p:ext>
-    </p:extLst>
-  </p:cSld>
-  <p:clrMapOvr>
-    <a:masterClrMapping/>
-  </p:clrMapOvr>
-  <p:timing>
-    <p:tnLst>
-      <p:par>
-        <p:cTn xmlns:p14="http://schemas.microsoft.com/office/powerpoint/2010/main" id="1" dur="indefinite" restart="never" nodeType="tmRoot"/>
-      </p:par>
-    </p:tnLst>
-  </p:timing>
-</p:sld>
-</file>
-
-<file path=ppt/slides/slide5.xml><?xml version="1.0" encoding="utf-8"?>
-<p:sld xmlns:a="http://schemas.openxmlformats.org/drawingml/2006/main" xmlns:r="http://schemas.openxmlformats.org/officeDocument/2006/relationships" xmlns:p="http://schemas.openxmlformats.org/presentationml/2006/main">
-  <p:cSld>
-    <p:spTree>
-      <p:nvGrpSpPr>
-        <p:cNvPr id="1" name=""/>
-        <p:cNvGrpSpPr/>
-        <p:nvPr/>
-      </p:nvGrpSpPr>
-      <p:grpSpPr>
-        <a:xfrm>
-          <a:off x="0" y="0"/>
-          <a:ext cx="0" cy="0"/>
-          <a:chOff x="0" y="0"/>
-          <a:chExt cx="0" cy="0"/>
-        </a:xfrm>
-      </p:grpSpPr>
-      <p:pic>
-        <p:nvPicPr>
-          <p:cNvPr id="3" name="Picture 2" descr="forward_slash_clause_boundary.png"/>
-          <p:cNvPicPr>
-            <a:picLocks noChangeAspect="1"/>
-          </p:cNvPicPr>
+      <p:sp>
+        <p:nvSpPr>
+          <p:cNvPr id="2" name="Oval 1"/>
+          <p:cNvSpPr/>
           <p:nvPr/>
-        </p:nvPicPr>
-        <p:blipFill>
-          <a:blip r:embed="rId3">
-            <a:extLst>
-              <a:ext uri="{28A0092B-C50C-407E-A947-70E740481C1C}">
-                <a14:useLocalDpi xmlns:a14="http://schemas.microsoft.com/office/drawing/2010/main" val="0"/>
-              </a:ext>
-            </a:extLst>
-          </a:blip>
-          <a:stretch>
-            <a:fillRect/>
-          </a:stretch>
-        </p:blipFill>
+        </p:nvSpPr>
         <p:spPr>
           <a:xfrm>
-            <a:off x="2215269" y="2719225"/>
-            <a:ext cx="4749800" cy="2019300"/>
+            <a:off x="1499455" y="3671879"/>
+            <a:ext cx="749728" cy="701759"/>
           </a:xfrm>
-          <a:prstGeom prst="rect">
-            <a:avLst/>
-          </a:prstGeom>
-        </p:spPr>
-      </p:pic>
-      <p:sp>
-        <p:nvSpPr>
-          <p:cNvPr id="4" name="TextBox 3"/>
-          <p:cNvSpPr txBox="1"/>
-          <p:nvPr/>
-        </p:nvSpPr>
-        <p:spPr>
-          <a:xfrm>
-            <a:off x="2815304" y="1334182"/>
-            <a:ext cx="3259021" cy="1077218"/>
-          </a:xfrm>
-          <a:prstGeom prst="rect">
+          <a:prstGeom prst="ellipse">
             <a:avLst/>
           </a:prstGeom>
           <a:noFill/>
+          <a:ln w="12700" cmpd="sng">
+            <a:solidFill>
+              <a:schemeClr val="tx2"/>
+            </a:solidFill>
+          </a:ln>
         </p:spPr>
-        <p:txBody>
-          <a:bodyPr wrap="square" rtlCol="0">
-            <a:spAutoFit/>
-          </a:bodyPr>
+        <p:style>
+          <a:lnRef idx="1">
+            <a:schemeClr val="accent1"/>
+          </a:lnRef>
+          <a:fillRef idx="3">
+            <a:schemeClr val="accent1"/>
+          </a:fillRef>
+          <a:effectRef idx="2">
+            <a:schemeClr val="accent1"/>
+          </a:effectRef>
+          <a:fontRef idx="minor">
+            <a:schemeClr val="lt1"/>
+          </a:fontRef>
+        </p:style>
+        <p:txBody>
+          <a:bodyPr rtlCol="0" anchor="ctr"/>
           <a:lstStyle/>
           <a:p>
             <a:pPr algn="ctr"/>
-            <a:r>
-              <a:rPr lang="en-US" sz="3200" dirty="0" smtClean="0"/>
-              <a:t>Punctuation</a:t>
-            </a:r>
-          </a:p>
+            <a:endParaRPr lang="en-US"/>
+          </a:p>
+        </p:txBody>
+      </p:sp>
+      <p:sp>
+        <p:nvSpPr>
+          <p:cNvPr id="7" name="Oval 6"/>
+          <p:cNvSpPr/>
+          <p:nvPr/>
+        </p:nvSpPr>
+        <p:spPr>
+          <a:xfrm>
+            <a:off x="6089624" y="3290399"/>
+            <a:ext cx="749728" cy="701759"/>
+          </a:xfrm>
+          <a:prstGeom prst="ellipse">
+            <a:avLst/>
+          </a:prstGeom>
+          <a:noFill/>
+          <a:ln w="12700" cmpd="sng">
+            <a:solidFill>
+              <a:schemeClr val="tx2"/>
+            </a:solidFill>
+          </a:ln>
+        </p:spPr>
+        <p:style>
+          <a:lnRef idx="1">
+            <a:schemeClr val="accent1"/>
+          </a:lnRef>
+          <a:fillRef idx="3">
+            <a:schemeClr val="accent1"/>
+          </a:fillRef>
+          <a:effectRef idx="2">
+            <a:schemeClr val="accent1"/>
+          </a:effectRef>
+          <a:fontRef idx="minor">
+            <a:schemeClr val="lt1"/>
+          </a:fontRef>
+        </p:style>
+        <p:txBody>
+          <a:bodyPr rtlCol="0" anchor="ctr"/>
+          <a:lstStyle/>
           <a:p>
             <a:pPr algn="ctr"/>
-            <a:r>
-              <a:rPr lang="en-US" sz="3200" dirty="0" smtClean="0"/>
-              <a:t> /   :   .</a:t>
-            </a:r>
-            <a:endParaRPr lang="en-US" sz="3200" dirty="0"/>
+            <a:endParaRPr lang="en-US"/>
           </a:p>
         </p:txBody>
       </p:sp>
@@ -7317,6 +6186,243 @@
 </file>
 
 <file path=ppt/slides/slide6.xml><?xml version="1.0" encoding="utf-8"?>
+<p:sld xmlns:a="http://schemas.openxmlformats.org/drawingml/2006/main" xmlns:r="http://schemas.openxmlformats.org/officeDocument/2006/relationships" xmlns:p="http://schemas.openxmlformats.org/presentationml/2006/main">
+  <p:cSld>
+    <p:spTree>
+      <p:nvGrpSpPr>
+        <p:cNvPr id="1" name=""/>
+        <p:cNvGrpSpPr/>
+        <p:nvPr/>
+      </p:nvGrpSpPr>
+      <p:grpSpPr>
+        <a:xfrm>
+          <a:off x="0" y="0"/>
+          <a:ext cx="0" cy="0"/>
+          <a:chOff x="0" y="0"/>
+          <a:chExt cx="0" cy="0"/>
+        </a:xfrm>
+      </p:grpSpPr>
+      <p:sp>
+        <p:nvSpPr>
+          <p:cNvPr id="4" name="TextBox 3"/>
+          <p:cNvSpPr txBox="1"/>
+          <p:nvPr/>
+        </p:nvSpPr>
+        <p:spPr>
+          <a:xfrm>
+            <a:off x="2815304" y="795573"/>
+            <a:ext cx="3259021" cy="1077218"/>
+          </a:xfrm>
+          <a:prstGeom prst="rect">
+            <a:avLst/>
+          </a:prstGeom>
+          <a:noFill/>
+        </p:spPr>
+        <p:txBody>
+          <a:bodyPr wrap="square" rtlCol="0">
+            <a:spAutoFit/>
+          </a:bodyPr>
+          <a:lstStyle/>
+          <a:p>
+            <a:pPr algn="ctr"/>
+            <a:r>
+              <a:rPr lang="en-US" sz="3200" dirty="0" smtClean="0"/>
+              <a:t>Punctuation</a:t>
+            </a:r>
+          </a:p>
+          <a:p>
+            <a:pPr algn="ctr"/>
+            <a:r>
+              <a:rPr lang="en-US" sz="3200" dirty="0" smtClean="0"/>
+              <a:t> /   :   .</a:t>
+            </a:r>
+            <a:endParaRPr lang="en-US" sz="3200" dirty="0"/>
+          </a:p>
+        </p:txBody>
+      </p:sp>
+      <p:pic>
+        <p:nvPicPr>
+          <p:cNvPr id="2" name="Picture 1" descr="Screen Shot 2015-10-30 at 9.09.45 AM.png"/>
+          <p:cNvPicPr>
+            <a:picLocks noChangeAspect="1"/>
+          </p:cNvPicPr>
+          <p:nvPr/>
+        </p:nvPicPr>
+        <p:blipFill>
+          <a:blip r:embed="rId3">
+            <a:extLst>
+              <a:ext uri="{28A0092B-C50C-407E-A947-70E740481C1C}">
+                <a14:useLocalDpi xmlns:a14="http://schemas.microsoft.com/office/drawing/2010/main" val="0"/>
+              </a:ext>
+            </a:extLst>
+          </a:blip>
+          <a:stretch>
+            <a:fillRect/>
+          </a:stretch>
+        </p:blipFill>
+        <p:spPr>
+          <a:xfrm>
+            <a:off x="1193445" y="2091696"/>
+            <a:ext cx="6604105" cy="3736651"/>
+          </a:xfrm>
+          <a:prstGeom prst="rect">
+            <a:avLst/>
+          </a:prstGeom>
+        </p:spPr>
+      </p:pic>
+      <p:sp>
+        <p:nvSpPr>
+          <p:cNvPr id="5" name="Oval 4"/>
+          <p:cNvSpPr/>
+          <p:nvPr/>
+        </p:nvSpPr>
+        <p:spPr>
+          <a:xfrm>
+            <a:off x="2998910" y="2447919"/>
+            <a:ext cx="749728" cy="701759"/>
+          </a:xfrm>
+          <a:prstGeom prst="ellipse">
+            <a:avLst/>
+          </a:prstGeom>
+          <a:noFill/>
+          <a:ln w="12700" cmpd="sng">
+            <a:solidFill>
+              <a:schemeClr val="tx2"/>
+            </a:solidFill>
+          </a:ln>
+        </p:spPr>
+        <p:style>
+          <a:lnRef idx="1">
+            <a:schemeClr val="accent1"/>
+          </a:lnRef>
+          <a:fillRef idx="3">
+            <a:schemeClr val="accent1"/>
+          </a:fillRef>
+          <a:effectRef idx="2">
+            <a:schemeClr val="accent1"/>
+          </a:effectRef>
+          <a:fontRef idx="minor">
+            <a:schemeClr val="lt1"/>
+          </a:fontRef>
+        </p:style>
+        <p:txBody>
+          <a:bodyPr rtlCol="0" anchor="ctr"/>
+          <a:lstStyle/>
+          <a:p>
+            <a:pPr algn="ctr"/>
+            <a:endParaRPr lang="en-US"/>
+          </a:p>
+        </p:txBody>
+      </p:sp>
+      <p:sp>
+        <p:nvSpPr>
+          <p:cNvPr id="6" name="Oval 5"/>
+          <p:cNvSpPr/>
+          <p:nvPr/>
+        </p:nvSpPr>
+        <p:spPr>
+          <a:xfrm>
+            <a:off x="6074325" y="4911138"/>
+            <a:ext cx="749728" cy="701759"/>
+          </a:xfrm>
+          <a:prstGeom prst="ellipse">
+            <a:avLst/>
+          </a:prstGeom>
+          <a:noFill/>
+          <a:ln w="12700" cmpd="sng">
+            <a:solidFill>
+              <a:schemeClr val="tx2"/>
+            </a:solidFill>
+          </a:ln>
+        </p:spPr>
+        <p:style>
+          <a:lnRef idx="1">
+            <a:schemeClr val="accent1"/>
+          </a:lnRef>
+          <a:fillRef idx="3">
+            <a:schemeClr val="accent1"/>
+          </a:fillRef>
+          <a:effectRef idx="2">
+            <a:schemeClr val="accent1"/>
+          </a:effectRef>
+          <a:fontRef idx="minor">
+            <a:schemeClr val="lt1"/>
+          </a:fontRef>
+        </p:style>
+        <p:txBody>
+          <a:bodyPr rtlCol="0" anchor="ctr"/>
+          <a:lstStyle/>
+          <a:p>
+            <a:pPr algn="ctr"/>
+            <a:endParaRPr lang="en-US"/>
+          </a:p>
+        </p:txBody>
+      </p:sp>
+      <p:sp>
+        <p:nvSpPr>
+          <p:cNvPr id="7" name="Oval 6"/>
+          <p:cNvSpPr/>
+          <p:nvPr/>
+        </p:nvSpPr>
+        <p:spPr>
+          <a:xfrm>
+            <a:off x="2815304" y="4560258"/>
+            <a:ext cx="749728" cy="701759"/>
+          </a:xfrm>
+          <a:prstGeom prst="ellipse">
+            <a:avLst/>
+          </a:prstGeom>
+          <a:noFill/>
+          <a:ln w="12700" cmpd="sng">
+            <a:solidFill>
+              <a:schemeClr val="tx2"/>
+            </a:solidFill>
+          </a:ln>
+        </p:spPr>
+        <p:style>
+          <a:lnRef idx="1">
+            <a:schemeClr val="accent1"/>
+          </a:lnRef>
+          <a:fillRef idx="3">
+            <a:schemeClr val="accent1"/>
+          </a:fillRef>
+          <a:effectRef idx="2">
+            <a:schemeClr val="accent1"/>
+          </a:effectRef>
+          <a:fontRef idx="minor">
+            <a:schemeClr val="lt1"/>
+          </a:fontRef>
+        </p:style>
+        <p:txBody>
+          <a:bodyPr rtlCol="0" anchor="ctr"/>
+          <a:lstStyle/>
+          <a:p>
+            <a:pPr algn="ctr"/>
+            <a:endParaRPr lang="en-US"/>
+          </a:p>
+        </p:txBody>
+      </p:sp>
+    </p:spTree>
+    <p:extLst>
+      <p:ext uri="{BB962C8B-B14F-4D97-AF65-F5344CB8AC3E}">
+        <p14:creationId xmlns:p14="http://schemas.microsoft.com/office/powerpoint/2010/main" val="3944512546"/>
+      </p:ext>
+    </p:extLst>
+  </p:cSld>
+  <p:clrMapOvr>
+    <a:masterClrMapping/>
+  </p:clrMapOvr>
+  <p:timing>
+    <p:tnLst>
+      <p:par>
+        <p:cTn xmlns:p14="http://schemas.microsoft.com/office/powerpoint/2010/main" id="1" dur="indefinite" restart="never" nodeType="tmRoot"/>
+      </p:par>
+    </p:tnLst>
+  </p:timing>
+</p:sld>
+</file>
+
+<file path=ppt/slides/slide7.xml><?xml version="1.0" encoding="utf-8"?>
 <p:sld xmlns:a="http://schemas.openxmlformats.org/drawingml/2006/main" xmlns:r="http://schemas.openxmlformats.org/officeDocument/2006/relationships" xmlns:p="http://schemas.openxmlformats.org/presentationml/2006/main">
   <p:cSld>
     <p:spTree>
@@ -7381,7 +6487,7 @@
 </p:sld>
 </file>
 
-<file path=ppt/slides/slide7.xml><?xml version="1.0" encoding="utf-8"?>
+<file path=ppt/slides/slide8.xml><?xml version="1.0" encoding="utf-8"?>
 <p:sld xmlns:a="http://schemas.openxmlformats.org/drawingml/2006/main" xmlns:r="http://schemas.openxmlformats.org/officeDocument/2006/relationships" xmlns:p="http://schemas.openxmlformats.org/presentationml/2006/main">
   <p:cSld>
     <p:spTree>
@@ -7448,7 +6554,7 @@
 </p:sld>
 </file>
 
-<file path=ppt/slides/slide8.xml><?xml version="1.0" encoding="utf-8"?>
+<file path=ppt/slides/slide9.xml><?xml version="1.0" encoding="utf-8"?>
 <p:sld xmlns:a="http://schemas.openxmlformats.org/drawingml/2006/main" xmlns:r="http://schemas.openxmlformats.org/officeDocument/2006/relationships" xmlns:p="http://schemas.openxmlformats.org/presentationml/2006/main">
   <p:cSld>
     <p:spTree>
@@ -7499,71 +6605,6 @@
     <p:extLst>
       <p:ext uri="{BB962C8B-B14F-4D97-AF65-F5344CB8AC3E}">
         <p14:creationId xmlns:p14="http://schemas.microsoft.com/office/powerpoint/2010/main" val="4183362266"/>
-      </p:ext>
-    </p:extLst>
-  </p:cSld>
-  <p:clrMapOvr>
-    <a:masterClrMapping/>
-  </p:clrMapOvr>
-  <p:timing>
-    <p:tnLst>
-      <p:par>
-        <p:cTn xmlns:p14="http://schemas.microsoft.com/office/powerpoint/2010/main" id="1" dur="indefinite" restart="never" nodeType="tmRoot"/>
-      </p:par>
-    </p:tnLst>
-  </p:timing>
-</p:sld>
-</file>
-
-<file path=ppt/slides/slide9.xml><?xml version="1.0" encoding="utf-8"?>
-<p:sld xmlns:a="http://schemas.openxmlformats.org/drawingml/2006/main" xmlns:r="http://schemas.openxmlformats.org/officeDocument/2006/relationships" xmlns:p="http://schemas.openxmlformats.org/presentationml/2006/main">
-  <p:cSld>
-    <p:spTree>
-      <p:nvGrpSpPr>
-        <p:cNvPr id="1" name=""/>
-        <p:cNvGrpSpPr/>
-        <p:nvPr/>
-      </p:nvGrpSpPr>
-      <p:grpSpPr>
-        <a:xfrm>
-          <a:off x="0" y="0"/>
-          <a:ext cx="0" cy="0"/>
-          <a:chOff x="0" y="0"/>
-          <a:chExt cx="0" cy="0"/>
-        </a:xfrm>
-      </p:grpSpPr>
-      <p:pic>
-        <p:nvPicPr>
-          <p:cNvPr id="5" name="Content Placeholder 4" descr="Screen Shot 2015-10-29 at 9.30.39 AM.png"/>
-          <p:cNvPicPr>
-            <a:picLocks noGrp="1" noChangeAspect="1"/>
-          </p:cNvPicPr>
-          <p:nvPr>
-            <p:ph idx="1"/>
-          </p:nvPr>
-        </p:nvPicPr>
-        <p:blipFill rotWithShape="1">
-          <a:blip r:embed="rId3">
-            <a:extLst>
-              <a:ext uri="{28A0092B-C50C-407E-A947-70E740481C1C}">
-                <a14:useLocalDpi xmlns:a14="http://schemas.microsoft.com/office/drawing/2010/main" val="0"/>
-              </a:ext>
-            </a:extLst>
-          </a:blip>
-          <a:srcRect l="2479" t="265" r="2991" b="265"/>
-          <a:stretch/>
-        </p:blipFill>
-        <p:spPr>
-          <a:xfrm>
-            <a:off x="229508" y="699909"/>
-            <a:ext cx="8751923" cy="5486400"/>
-          </a:xfrm>
-        </p:spPr>
-      </p:pic>
-    </p:spTree>
-    <p:extLst>
-      <p:ext uri="{BB962C8B-B14F-4D97-AF65-F5344CB8AC3E}">
-        <p14:creationId xmlns:p14="http://schemas.microsoft.com/office/powerpoint/2010/main" val="1971268345"/>
       </p:ext>
     </p:extLst>
   </p:cSld>

</xml_diff>

<commit_message>
revised to prepare for Elisa's slides
</commit_message>
<xml_diff>
--- a/Amadis_tei_conf_images.pptx
+++ b/Amadis_tei_conf_images.pptx
@@ -979,11 +979,7 @@
           <a:p>
             <a:r>
               <a:rPr lang="en-US" dirty="0" smtClean="0"/>
-              <a:t>From </a:t>
-            </a:r>
-            <a:r>
-              <a:rPr lang="en-US" smtClean="0"/>
-              <a:t>the Preface (xxi)</a:t>
+              <a:t>From the Preface (xxi)</a:t>
             </a:r>
             <a:endParaRPr lang="en-US" dirty="0"/>
           </a:p>
@@ -1255,27 +1251,19 @@
           <a:p>
             <a:r>
               <a:rPr lang="en-US" dirty="0" smtClean="0"/>
-              <a:t>Anthon</a:t>
+              <a:t>First note references the Spanish. It’s one of the few examples we’ve found of a misreading or mistranslation</a:t>
             </a:r>
             <a:r>
               <a:rPr lang="en-US" baseline="0" dirty="0" smtClean="0"/>
-              <a:t>y </a:t>
-            </a:r>
-            <a:r>
-              <a:rPr lang="en-US" baseline="0" dirty="0" err="1" smtClean="0"/>
-              <a:t>Munday’s</a:t>
+              <a:t> by Southey.</a:t>
+            </a:r>
+            <a:r>
+              <a:rPr lang="en-US" dirty="0" smtClean="0"/>
+              <a:t> Second note references</a:t>
             </a:r>
             <a:r>
               <a:rPr lang="en-US" baseline="0" dirty="0" smtClean="0"/>
-              <a:t> </a:t>
-            </a:r>
-            <a:r>
-              <a:rPr lang="en-US" baseline="0" dirty="0" err="1" smtClean="0"/>
-              <a:t>Amadis</a:t>
-            </a:r>
-            <a:r>
-              <a:rPr lang="en-US" baseline="0" dirty="0" smtClean="0"/>
-              <a:t> is 1590</a:t>
+              <a:t> another translation. </a:t>
             </a:r>
             <a:endParaRPr lang="en-US" dirty="0"/>
           </a:p>
@@ -6017,25 +6005,30 @@
           </a:xfrm>
         </p:spPr>
         <p:txBody>
-          <a:bodyPr/>
+          <a:bodyPr>
+            <a:normAutofit/>
+          </a:bodyPr>
           <a:lstStyle/>
           <a:p>
             <a:pPr marL="0" indent="0">
+              <a:lnSpc>
+                <a:spcPct val="130000"/>
+              </a:lnSpc>
               <a:buNone/>
             </a:pPr>
             <a:r>
-              <a:rPr lang="en-US" dirty="0" smtClean="0"/>
-              <a:t>To </a:t>
-            </a:r>
-            <a:r>
-              <a:rPr lang="en-US" dirty="0"/>
+              <a:rPr lang="en-US" sz="2800" dirty="0" smtClean="0"/>
+              <a:t>“To </a:t>
+            </a:r>
+            <a:r>
+              <a:rPr lang="en-US" sz="2800" dirty="0"/>
               <a:t>have translated a closely printed folio would have been absurd. I have reduced it to about half its length, by abridging the words, not the story […] There is no vanity in saying, that this has improved the book, for what long work may not be improved by compression</a:t>
             </a:r>
             <a:r>
-              <a:rPr lang="en-US" dirty="0" smtClean="0"/>
-              <a:t>?</a:t>
-            </a:r>
-            <a:endParaRPr lang="en-US" dirty="0"/>
+              <a:rPr lang="en-US" sz="2800" dirty="0" smtClean="0"/>
+              <a:t>?”</a:t>
+            </a:r>
+            <a:endParaRPr lang="en-US" sz="2800" dirty="0"/>
           </a:p>
         </p:txBody>
       </p:sp>
@@ -6051,7 +6044,7 @@
         </p:nvSpPr>
         <p:spPr>
           <a:xfrm>
-            <a:off x="457200" y="869989"/>
+            <a:off x="227691" y="869989"/>
             <a:ext cx="8229600" cy="990600"/>
           </a:xfrm>
         </p:spPr>
@@ -6064,7 +6057,15 @@
             <a:pPr algn="ctr"/>
             <a:r>
               <a:rPr lang="en-US" b="1" dirty="0" smtClean="0"/>
-              <a:t>Robert Southey on translation</a:t>
+              <a:t>Robert Southey on </a:t>
+            </a:r>
+            <a:r>
+              <a:rPr lang="en-US" b="1" i="1" dirty="0" err="1" smtClean="0"/>
+              <a:t>Amad</a:t>
+            </a:r>
+            <a:r>
+              <a:rPr lang="en-US" b="1" i="1" dirty="0" err="1" smtClean="0"/>
+              <a:t>ís</a:t>
             </a:r>
             <a:endParaRPr lang="en-US" dirty="0"/>
           </a:p>

</xml_diff>